<commit_message>
add lambda functions to lecture 6
</commit_message>
<xml_diff>
--- a/classes/prog2017/Prog3-Lecture06.pptx
+++ b/classes/prog2017/Prog3-Lecture06.pptx
@@ -5,7 +5,7 @@
     <p:sldMasterId id="2147483648" r:id="rId1"/>
   </p:sldMasterIdLst>
   <p:notesMasterIdLst>
-    <p:notesMasterId r:id="rId38"/>
+    <p:notesMasterId r:id="rId40"/>
   </p:notesMasterIdLst>
   <p:sldIdLst>
     <p:sldId id="256" r:id="rId2"/>
@@ -43,7 +43,9 @@
     <p:sldId id="291" r:id="rId34"/>
     <p:sldId id="294" r:id="rId35"/>
     <p:sldId id="293" r:id="rId36"/>
-    <p:sldId id="284" r:id="rId37"/>
+    <p:sldId id="296" r:id="rId37"/>
+    <p:sldId id="297" r:id="rId38"/>
+    <p:sldId id="284" r:id="rId39"/>
   </p:sldIdLst>
   <p:sldSz cx="9144000" cy="6858000" type="screen4x3"/>
   <p:notesSz cx="6858000" cy="9144000"/>
@@ -142,7 +144,27 @@
       </a:defRPr>
     </a:lvl9pPr>
   </p:defaultTextStyle>
+  <p:extLst>
+    <p:ext uri="{EFAFB233-063F-42B5-8137-9DF3F51BA10A}">
+      <p15:sldGuideLst xmlns:p15="http://schemas.microsoft.com/office/powerpoint/2012/main">
+        <p15:guide id="1" orient="horz" pos="2160">
+          <p15:clr>
+            <a:srgbClr val="A4A3A4"/>
+          </p15:clr>
+        </p15:guide>
+        <p15:guide id="2" pos="2880">
+          <p15:clr>
+            <a:srgbClr val="A4A3A4"/>
+          </p15:clr>
+        </p15:guide>
+      </p15:sldGuideLst>
+    </p:ext>
+  </p:extLst>
 </p:presentation>
+</file>
+
+<file path=ppt/revisionInfo.xml><?xml version="1.0" encoding="utf-8"?>
+<p1510:revInfo xmlns:a="http://schemas.openxmlformats.org/drawingml/2006/main" xmlns:r="http://schemas.openxmlformats.org/officeDocument/2006/relationships" xmlns:p1510="http://schemas.microsoft.com/office/powerpoint/2015/10/main"/>
 </file>
 
 <file path=ppt/notesMasters/notesMaster1.xml><?xml version="1.0" encoding="utf-8"?>
@@ -228,7 +250,7 @@
             <a:fld id="{6420E675-AAC5-45A6-BC13-6BACD2C456F7}" type="datetimeFigureOut">
               <a:rPr lang="en-US" smtClean="0"/>
               <a:pPr/>
-              <a:t>8/28/2014</a:t>
+              <a:t>9/1/2017</a:t>
             </a:fld>
             <a:endParaRPr lang="en-US"/>
           </a:p>
@@ -294,38 +316,37 @@
           <a:p>
             <a:pPr lvl="0"/>
             <a:r>
-              <a:rPr lang="en-US" smtClean="0"/>
+              <a:rPr lang="en-US"/>
               <a:t>Click to edit Master text styles</a:t>
             </a:r>
           </a:p>
           <a:p>
             <a:pPr lvl="1"/>
             <a:r>
-              <a:rPr lang="en-US" smtClean="0"/>
+              <a:rPr lang="en-US"/>
               <a:t>Second level</a:t>
             </a:r>
           </a:p>
           <a:p>
             <a:pPr lvl="2"/>
             <a:r>
-              <a:rPr lang="en-US" smtClean="0"/>
+              <a:rPr lang="en-US"/>
               <a:t>Third level</a:t>
             </a:r>
           </a:p>
           <a:p>
             <a:pPr lvl="3"/>
             <a:r>
-              <a:rPr lang="en-US" smtClean="0"/>
+              <a:rPr lang="en-US"/>
               <a:t>Fourth level</a:t>
             </a:r>
           </a:p>
           <a:p>
             <a:pPr lvl="4"/>
             <a:r>
-              <a:rPr lang="en-US" smtClean="0"/>
+              <a:rPr lang="en-US"/>
               <a:t>Fifth level</a:t>
             </a:r>
-            <a:endParaRPr lang="en-US"/>
           </a:p>
         </p:txBody>
       </p:sp>
@@ -2940,7 +2961,7 @@
             <a:fld id="{E6BB975B-FD37-46B4-979A-A3CB936E818D}" type="slidenum">
               <a:rPr lang="en-US" smtClean="0"/>
               <a:pPr/>
-              <a:t>36</a:t>
+              <a:t>38</a:t>
             </a:fld>
             <a:endParaRPr lang="en-US"/>
           </a:p>
@@ -3484,10 +3505,9 @@
           <a:lstStyle/>
           <a:p>
             <a:r>
-              <a:rPr lang="en-US" smtClean="0"/>
+              <a:rPr lang="en-US"/>
               <a:t>Click to edit Master title style</a:t>
             </a:r>
-            <a:endParaRPr lang="en-US"/>
           </a:p>
         </p:txBody>
       </p:sp>
@@ -3603,10 +3623,9 @@
           </a:lstStyle>
           <a:p>
             <a:r>
-              <a:rPr lang="en-US" smtClean="0"/>
+              <a:rPr lang="en-US"/>
               <a:t>Click to edit Master subtitle style</a:t>
             </a:r>
-            <a:endParaRPr lang="en-US"/>
           </a:p>
         </p:txBody>
       </p:sp>
@@ -3628,7 +3647,7 @@
             <a:fld id="{1D8BD707-D9CF-40AE-B4C6-C98DA3205C09}" type="datetimeFigureOut">
               <a:rPr lang="en-US" smtClean="0"/>
               <a:pPr/>
-              <a:t>8/28/2014</a:t>
+              <a:t>9/1/2017</a:t>
             </a:fld>
             <a:endParaRPr lang="en-US"/>
           </a:p>
@@ -3718,10 +3737,9 @@
           <a:lstStyle/>
           <a:p>
             <a:r>
-              <a:rPr lang="en-US" smtClean="0"/>
+              <a:rPr lang="en-US"/>
               <a:t>Click to edit Master title style</a:t>
             </a:r>
-            <a:endParaRPr lang="en-US"/>
           </a:p>
         </p:txBody>
       </p:sp>
@@ -3742,38 +3760,37 @@
           <a:p>
             <a:pPr lvl="0"/>
             <a:r>
-              <a:rPr lang="en-US" smtClean="0"/>
+              <a:rPr lang="en-US"/>
               <a:t>Click to edit Master text styles</a:t>
             </a:r>
           </a:p>
           <a:p>
             <a:pPr lvl="1"/>
             <a:r>
-              <a:rPr lang="en-US" smtClean="0"/>
+              <a:rPr lang="en-US"/>
               <a:t>Second level</a:t>
             </a:r>
           </a:p>
           <a:p>
             <a:pPr lvl="2"/>
             <a:r>
-              <a:rPr lang="en-US" smtClean="0"/>
+              <a:rPr lang="en-US"/>
               <a:t>Third level</a:t>
             </a:r>
           </a:p>
           <a:p>
             <a:pPr lvl="3"/>
             <a:r>
-              <a:rPr lang="en-US" smtClean="0"/>
+              <a:rPr lang="en-US"/>
               <a:t>Fourth level</a:t>
             </a:r>
           </a:p>
           <a:p>
             <a:pPr lvl="4"/>
             <a:r>
-              <a:rPr lang="en-US" smtClean="0"/>
+              <a:rPr lang="en-US"/>
               <a:t>Fifth level</a:t>
             </a:r>
-            <a:endParaRPr lang="en-US"/>
           </a:p>
         </p:txBody>
       </p:sp>
@@ -3795,7 +3812,7 @@
             <a:fld id="{1D8BD707-D9CF-40AE-B4C6-C98DA3205C09}" type="datetimeFigureOut">
               <a:rPr lang="en-US" smtClean="0"/>
               <a:pPr/>
-              <a:t>8/28/2014</a:t>
+              <a:t>9/1/2017</a:t>
             </a:fld>
             <a:endParaRPr lang="en-US"/>
           </a:p>
@@ -3890,10 +3907,9 @@
           <a:lstStyle/>
           <a:p>
             <a:r>
-              <a:rPr lang="en-US" smtClean="0"/>
+              <a:rPr lang="en-US"/>
               <a:t>Click to edit Master title style</a:t>
             </a:r>
-            <a:endParaRPr lang="en-US"/>
           </a:p>
         </p:txBody>
       </p:sp>
@@ -3919,38 +3935,37 @@
           <a:p>
             <a:pPr lvl="0"/>
             <a:r>
-              <a:rPr lang="en-US" smtClean="0"/>
+              <a:rPr lang="en-US"/>
               <a:t>Click to edit Master text styles</a:t>
             </a:r>
           </a:p>
           <a:p>
             <a:pPr lvl="1"/>
             <a:r>
-              <a:rPr lang="en-US" smtClean="0"/>
+              <a:rPr lang="en-US"/>
               <a:t>Second level</a:t>
             </a:r>
           </a:p>
           <a:p>
             <a:pPr lvl="2"/>
             <a:r>
-              <a:rPr lang="en-US" smtClean="0"/>
+              <a:rPr lang="en-US"/>
               <a:t>Third level</a:t>
             </a:r>
           </a:p>
           <a:p>
             <a:pPr lvl="3"/>
             <a:r>
-              <a:rPr lang="en-US" smtClean="0"/>
+              <a:rPr lang="en-US"/>
               <a:t>Fourth level</a:t>
             </a:r>
           </a:p>
           <a:p>
             <a:pPr lvl="4"/>
             <a:r>
-              <a:rPr lang="en-US" smtClean="0"/>
+              <a:rPr lang="en-US"/>
               <a:t>Fifth level</a:t>
             </a:r>
-            <a:endParaRPr lang="en-US"/>
           </a:p>
         </p:txBody>
       </p:sp>
@@ -3972,7 +3987,7 @@
             <a:fld id="{1D8BD707-D9CF-40AE-B4C6-C98DA3205C09}" type="datetimeFigureOut">
               <a:rPr lang="en-US" smtClean="0"/>
               <a:pPr/>
-              <a:t>8/28/2014</a:t>
+              <a:t>9/1/2017</a:t>
             </a:fld>
             <a:endParaRPr lang="en-US"/>
           </a:p>
@@ -4062,10 +4077,9 @@
           <a:lstStyle/>
           <a:p>
             <a:r>
-              <a:rPr lang="en-US" smtClean="0"/>
+              <a:rPr lang="en-US"/>
               <a:t>Click to edit Master title style</a:t>
             </a:r>
-            <a:endParaRPr lang="en-US"/>
           </a:p>
         </p:txBody>
       </p:sp>
@@ -4086,38 +4100,37 @@
           <a:p>
             <a:pPr lvl="0"/>
             <a:r>
-              <a:rPr lang="en-US" smtClean="0"/>
+              <a:rPr lang="en-US"/>
               <a:t>Click to edit Master text styles</a:t>
             </a:r>
           </a:p>
           <a:p>
             <a:pPr lvl="1"/>
             <a:r>
-              <a:rPr lang="en-US" smtClean="0"/>
+              <a:rPr lang="en-US"/>
               <a:t>Second level</a:t>
             </a:r>
           </a:p>
           <a:p>
             <a:pPr lvl="2"/>
             <a:r>
-              <a:rPr lang="en-US" smtClean="0"/>
+              <a:rPr lang="en-US"/>
               <a:t>Third level</a:t>
             </a:r>
           </a:p>
           <a:p>
             <a:pPr lvl="3"/>
             <a:r>
-              <a:rPr lang="en-US" smtClean="0"/>
+              <a:rPr lang="en-US"/>
               <a:t>Fourth level</a:t>
             </a:r>
           </a:p>
           <a:p>
             <a:pPr lvl="4"/>
             <a:r>
-              <a:rPr lang="en-US" smtClean="0"/>
+              <a:rPr lang="en-US"/>
               <a:t>Fifth level</a:t>
             </a:r>
-            <a:endParaRPr lang="en-US"/>
           </a:p>
         </p:txBody>
       </p:sp>
@@ -4139,7 +4152,7 @@
             <a:fld id="{1D8BD707-D9CF-40AE-B4C6-C98DA3205C09}" type="datetimeFigureOut">
               <a:rPr lang="en-US" smtClean="0"/>
               <a:pPr/>
-              <a:t>8/28/2014</a:t>
+              <a:t>9/1/2017</a:t>
             </a:fld>
             <a:endParaRPr lang="en-US"/>
           </a:p>
@@ -4238,10 +4251,9 @@
           </a:lstStyle>
           <a:p>
             <a:r>
-              <a:rPr lang="en-US" smtClean="0"/>
+              <a:rPr lang="en-US"/>
               <a:t>Click to edit Master title style</a:t>
             </a:r>
-            <a:endParaRPr lang="en-US"/>
           </a:p>
         </p:txBody>
       </p:sp>
@@ -4358,7 +4370,7 @@
           <a:p>
             <a:pPr lvl="0"/>
             <a:r>
-              <a:rPr lang="en-US" smtClean="0"/>
+              <a:rPr lang="en-US"/>
               <a:t>Click to edit Master text styles</a:t>
             </a:r>
           </a:p>
@@ -4382,7 +4394,7 @@
             <a:fld id="{1D8BD707-D9CF-40AE-B4C6-C98DA3205C09}" type="datetimeFigureOut">
               <a:rPr lang="en-US" smtClean="0"/>
               <a:pPr/>
-              <a:t>8/28/2014</a:t>
+              <a:t>9/1/2017</a:t>
             </a:fld>
             <a:endParaRPr lang="en-US"/>
           </a:p>
@@ -4472,10 +4484,9 @@
           <a:lstStyle/>
           <a:p>
             <a:r>
-              <a:rPr lang="en-US" smtClean="0"/>
+              <a:rPr lang="en-US"/>
               <a:t>Click to edit Master title style</a:t>
             </a:r>
-            <a:endParaRPr lang="en-US"/>
           </a:p>
         </p:txBody>
       </p:sp>
@@ -4529,38 +4540,37 @@
           <a:p>
             <a:pPr lvl="0"/>
             <a:r>
-              <a:rPr lang="en-US" smtClean="0"/>
+              <a:rPr lang="en-US"/>
               <a:t>Click to edit Master text styles</a:t>
             </a:r>
           </a:p>
           <a:p>
             <a:pPr lvl="1"/>
             <a:r>
-              <a:rPr lang="en-US" smtClean="0"/>
+              <a:rPr lang="en-US"/>
               <a:t>Second level</a:t>
             </a:r>
           </a:p>
           <a:p>
             <a:pPr lvl="2"/>
             <a:r>
-              <a:rPr lang="en-US" smtClean="0"/>
+              <a:rPr lang="en-US"/>
               <a:t>Third level</a:t>
             </a:r>
           </a:p>
           <a:p>
             <a:pPr lvl="3"/>
             <a:r>
-              <a:rPr lang="en-US" smtClean="0"/>
+              <a:rPr lang="en-US"/>
               <a:t>Fourth level</a:t>
             </a:r>
           </a:p>
           <a:p>
             <a:pPr lvl="4"/>
             <a:r>
-              <a:rPr lang="en-US" smtClean="0"/>
+              <a:rPr lang="en-US"/>
               <a:t>Fifth level</a:t>
             </a:r>
-            <a:endParaRPr lang="en-US"/>
           </a:p>
         </p:txBody>
       </p:sp>
@@ -4614,38 +4624,37 @@
           <a:p>
             <a:pPr lvl="0"/>
             <a:r>
-              <a:rPr lang="en-US" smtClean="0"/>
+              <a:rPr lang="en-US"/>
               <a:t>Click to edit Master text styles</a:t>
             </a:r>
           </a:p>
           <a:p>
             <a:pPr lvl="1"/>
             <a:r>
-              <a:rPr lang="en-US" smtClean="0"/>
+              <a:rPr lang="en-US"/>
               <a:t>Second level</a:t>
             </a:r>
           </a:p>
           <a:p>
             <a:pPr lvl="2"/>
             <a:r>
-              <a:rPr lang="en-US" smtClean="0"/>
+              <a:rPr lang="en-US"/>
               <a:t>Third level</a:t>
             </a:r>
           </a:p>
           <a:p>
             <a:pPr lvl="3"/>
             <a:r>
-              <a:rPr lang="en-US" smtClean="0"/>
+              <a:rPr lang="en-US"/>
               <a:t>Fourth level</a:t>
             </a:r>
           </a:p>
           <a:p>
             <a:pPr lvl="4"/>
             <a:r>
-              <a:rPr lang="en-US" smtClean="0"/>
+              <a:rPr lang="en-US"/>
               <a:t>Fifth level</a:t>
             </a:r>
-            <a:endParaRPr lang="en-US"/>
           </a:p>
         </p:txBody>
       </p:sp>
@@ -4667,7 +4676,7 @@
             <a:fld id="{1D8BD707-D9CF-40AE-B4C6-C98DA3205C09}" type="datetimeFigureOut">
               <a:rPr lang="en-US" smtClean="0"/>
               <a:pPr/>
-              <a:t>8/28/2014</a:t>
+              <a:t>9/1/2017</a:t>
             </a:fld>
             <a:endParaRPr lang="en-US"/>
           </a:p>
@@ -4761,10 +4770,9 @@
           </a:lstStyle>
           <a:p>
             <a:r>
-              <a:rPr lang="en-US" smtClean="0"/>
+              <a:rPr lang="en-US"/>
               <a:t>Click to edit Master title style</a:t>
             </a:r>
-            <a:endParaRPr lang="en-US"/>
           </a:p>
         </p:txBody>
       </p:sp>
@@ -4827,7 +4835,7 @@
           <a:p>
             <a:pPr lvl="0"/>
             <a:r>
-              <a:rPr lang="en-US" smtClean="0"/>
+              <a:rPr lang="en-US"/>
               <a:t>Click to edit Master text styles</a:t>
             </a:r>
           </a:p>
@@ -4883,38 +4891,37 @@
           <a:p>
             <a:pPr lvl="0"/>
             <a:r>
-              <a:rPr lang="en-US" smtClean="0"/>
+              <a:rPr lang="en-US"/>
               <a:t>Click to edit Master text styles</a:t>
             </a:r>
           </a:p>
           <a:p>
             <a:pPr lvl="1"/>
             <a:r>
-              <a:rPr lang="en-US" smtClean="0"/>
+              <a:rPr lang="en-US"/>
               <a:t>Second level</a:t>
             </a:r>
           </a:p>
           <a:p>
             <a:pPr lvl="2"/>
             <a:r>
-              <a:rPr lang="en-US" smtClean="0"/>
+              <a:rPr lang="en-US"/>
               <a:t>Third level</a:t>
             </a:r>
           </a:p>
           <a:p>
             <a:pPr lvl="3"/>
             <a:r>
-              <a:rPr lang="en-US" smtClean="0"/>
+              <a:rPr lang="en-US"/>
               <a:t>Fourth level</a:t>
             </a:r>
           </a:p>
           <a:p>
             <a:pPr lvl="4"/>
             <a:r>
-              <a:rPr lang="en-US" smtClean="0"/>
+              <a:rPr lang="en-US"/>
               <a:t>Fifth level</a:t>
             </a:r>
-            <a:endParaRPr lang="en-US"/>
           </a:p>
         </p:txBody>
       </p:sp>
@@ -4977,7 +4984,7 @@
           <a:p>
             <a:pPr lvl="0"/>
             <a:r>
-              <a:rPr lang="en-US" smtClean="0"/>
+              <a:rPr lang="en-US"/>
               <a:t>Click to edit Master text styles</a:t>
             </a:r>
           </a:p>
@@ -5033,38 +5040,37 @@
           <a:p>
             <a:pPr lvl="0"/>
             <a:r>
-              <a:rPr lang="en-US" smtClean="0"/>
+              <a:rPr lang="en-US"/>
               <a:t>Click to edit Master text styles</a:t>
             </a:r>
           </a:p>
           <a:p>
             <a:pPr lvl="1"/>
             <a:r>
-              <a:rPr lang="en-US" smtClean="0"/>
+              <a:rPr lang="en-US"/>
               <a:t>Second level</a:t>
             </a:r>
           </a:p>
           <a:p>
             <a:pPr lvl="2"/>
             <a:r>
-              <a:rPr lang="en-US" smtClean="0"/>
+              <a:rPr lang="en-US"/>
               <a:t>Third level</a:t>
             </a:r>
           </a:p>
           <a:p>
             <a:pPr lvl="3"/>
             <a:r>
-              <a:rPr lang="en-US" smtClean="0"/>
+              <a:rPr lang="en-US"/>
               <a:t>Fourth level</a:t>
             </a:r>
           </a:p>
           <a:p>
             <a:pPr lvl="4"/>
             <a:r>
-              <a:rPr lang="en-US" smtClean="0"/>
+              <a:rPr lang="en-US"/>
               <a:t>Fifth level</a:t>
             </a:r>
-            <a:endParaRPr lang="en-US"/>
           </a:p>
         </p:txBody>
       </p:sp>
@@ -5086,7 +5092,7 @@
             <a:fld id="{1D8BD707-D9CF-40AE-B4C6-C98DA3205C09}" type="datetimeFigureOut">
               <a:rPr lang="en-US" smtClean="0"/>
               <a:pPr/>
-              <a:t>8/28/2014</a:t>
+              <a:t>9/1/2017</a:t>
             </a:fld>
             <a:endParaRPr lang="en-US"/>
           </a:p>
@@ -5176,10 +5182,9 @@
           <a:lstStyle/>
           <a:p>
             <a:r>
-              <a:rPr lang="en-US" smtClean="0"/>
+              <a:rPr lang="en-US"/>
               <a:t>Click to edit Master title style</a:t>
             </a:r>
-            <a:endParaRPr lang="en-US"/>
           </a:p>
         </p:txBody>
       </p:sp>
@@ -5201,7 +5206,7 @@
             <a:fld id="{1D8BD707-D9CF-40AE-B4C6-C98DA3205C09}" type="datetimeFigureOut">
               <a:rPr lang="en-US" smtClean="0"/>
               <a:pPr/>
-              <a:t>8/28/2014</a:t>
+              <a:t>9/1/2017</a:t>
             </a:fld>
             <a:endParaRPr lang="en-US"/>
           </a:p>
@@ -5293,7 +5298,7 @@
             <a:fld id="{1D8BD707-D9CF-40AE-B4C6-C98DA3205C09}" type="datetimeFigureOut">
               <a:rPr lang="en-US" smtClean="0"/>
               <a:pPr/>
-              <a:t>8/28/2014</a:t>
+              <a:t>9/1/2017</a:t>
             </a:fld>
             <a:endParaRPr lang="en-US"/>
           </a:p>
@@ -5392,10 +5397,9 @@
           </a:lstStyle>
           <a:p>
             <a:r>
-              <a:rPr lang="en-US" smtClean="0"/>
+              <a:rPr lang="en-US"/>
               <a:t>Click to edit Master title style</a:t>
             </a:r>
-            <a:endParaRPr lang="en-US"/>
           </a:p>
         </p:txBody>
       </p:sp>
@@ -5449,38 +5453,37 @@
           <a:p>
             <a:pPr lvl="0"/>
             <a:r>
-              <a:rPr lang="en-US" smtClean="0"/>
+              <a:rPr lang="en-US"/>
               <a:t>Click to edit Master text styles</a:t>
             </a:r>
           </a:p>
           <a:p>
             <a:pPr lvl="1"/>
             <a:r>
-              <a:rPr lang="en-US" smtClean="0"/>
+              <a:rPr lang="en-US"/>
               <a:t>Second level</a:t>
             </a:r>
           </a:p>
           <a:p>
             <a:pPr lvl="2"/>
             <a:r>
-              <a:rPr lang="en-US" smtClean="0"/>
+              <a:rPr lang="en-US"/>
               <a:t>Third level</a:t>
             </a:r>
           </a:p>
           <a:p>
             <a:pPr lvl="3"/>
             <a:r>
-              <a:rPr lang="en-US" smtClean="0"/>
+              <a:rPr lang="en-US"/>
               <a:t>Fourth level</a:t>
             </a:r>
           </a:p>
           <a:p>
             <a:pPr lvl="4"/>
             <a:r>
-              <a:rPr lang="en-US" smtClean="0"/>
+              <a:rPr lang="en-US"/>
               <a:t>Fifth level</a:t>
             </a:r>
-            <a:endParaRPr lang="en-US"/>
           </a:p>
         </p:txBody>
       </p:sp>
@@ -5543,7 +5546,7 @@
           <a:p>
             <a:pPr lvl="0"/>
             <a:r>
-              <a:rPr lang="en-US" smtClean="0"/>
+              <a:rPr lang="en-US"/>
               <a:t>Click to edit Master text styles</a:t>
             </a:r>
           </a:p>
@@ -5567,7 +5570,7 @@
             <a:fld id="{1D8BD707-D9CF-40AE-B4C6-C98DA3205C09}" type="datetimeFigureOut">
               <a:rPr lang="en-US" smtClean="0"/>
               <a:pPr/>
-              <a:t>8/28/2014</a:t>
+              <a:t>9/1/2017</a:t>
             </a:fld>
             <a:endParaRPr lang="en-US"/>
           </a:p>
@@ -5666,10 +5669,9 @@
           </a:lstStyle>
           <a:p>
             <a:r>
-              <a:rPr lang="en-US" smtClean="0"/>
+              <a:rPr lang="en-US"/>
               <a:t>Click to edit Master title style</a:t>
             </a:r>
-            <a:endParaRPr lang="en-US"/>
           </a:p>
         </p:txBody>
       </p:sp>
@@ -5793,7 +5795,7 @@
           <a:p>
             <a:pPr lvl="0"/>
             <a:r>
-              <a:rPr lang="en-US" smtClean="0"/>
+              <a:rPr lang="en-US"/>
               <a:t>Click to edit Master text styles</a:t>
             </a:r>
           </a:p>
@@ -5817,7 +5819,7 @@
             <a:fld id="{1D8BD707-D9CF-40AE-B4C6-C98DA3205C09}" type="datetimeFigureOut">
               <a:rPr lang="en-US" smtClean="0"/>
               <a:pPr/>
-              <a:t>8/28/2014</a:t>
+              <a:t>9/1/2017</a:t>
             </a:fld>
             <a:endParaRPr lang="en-US"/>
           </a:p>
@@ -5922,10 +5924,9 @@
           <a:lstStyle/>
           <a:p>
             <a:r>
-              <a:rPr lang="en-US" smtClean="0"/>
+              <a:rPr lang="en-US"/>
               <a:t>Click to edit Master title style</a:t>
             </a:r>
-            <a:endParaRPr lang="en-US"/>
           </a:p>
         </p:txBody>
       </p:sp>
@@ -5956,38 +5957,37 @@
           <a:p>
             <a:pPr lvl="0"/>
             <a:r>
-              <a:rPr lang="en-US" smtClean="0"/>
+              <a:rPr lang="en-US"/>
               <a:t>Click to edit Master text styles</a:t>
             </a:r>
           </a:p>
           <a:p>
             <a:pPr lvl="1"/>
             <a:r>
-              <a:rPr lang="en-US" smtClean="0"/>
+              <a:rPr lang="en-US"/>
               <a:t>Second level</a:t>
             </a:r>
           </a:p>
           <a:p>
             <a:pPr lvl="2"/>
             <a:r>
-              <a:rPr lang="en-US" smtClean="0"/>
+              <a:rPr lang="en-US"/>
               <a:t>Third level</a:t>
             </a:r>
           </a:p>
           <a:p>
             <a:pPr lvl="3"/>
             <a:r>
-              <a:rPr lang="en-US" smtClean="0"/>
+              <a:rPr lang="en-US"/>
               <a:t>Fourth level</a:t>
             </a:r>
           </a:p>
           <a:p>
             <a:pPr lvl="4"/>
             <a:r>
-              <a:rPr lang="en-US" smtClean="0"/>
+              <a:rPr lang="en-US"/>
               <a:t>Fifth level</a:t>
             </a:r>
-            <a:endParaRPr lang="en-US"/>
           </a:p>
         </p:txBody>
       </p:sp>
@@ -6027,7 +6027,7 @@
             <a:fld id="{1D8BD707-D9CF-40AE-B4C6-C98DA3205C09}" type="datetimeFigureOut">
               <a:rPr lang="en-US" smtClean="0"/>
               <a:pPr/>
-              <a:t>8/28/2014</a:t>
+              <a:t>9/1/2017</a:t>
             </a:fld>
             <a:endParaRPr lang="en-US"/>
           </a:p>
@@ -6421,35 +6421,34 @@
           <a:lstStyle/>
           <a:p>
             <a:r>
-              <a:rPr lang="en-US" dirty="0" smtClean="0"/>
+              <a:rPr lang="en-US" dirty="0"/>
               <a:t>Interfaces</a:t>
             </a:r>
           </a:p>
           <a:p>
             <a:r>
-              <a:rPr lang="en-US" dirty="0" smtClean="0"/>
+              <a:rPr lang="en-US" dirty="0"/>
               <a:t>List, </a:t>
             </a:r>
             <a:r>
-              <a:rPr lang="en-US" dirty="0" err="1" smtClean="0"/>
+              <a:rPr lang="en-US" dirty="0" err="1"/>
               <a:t>ArrayList</a:t>
             </a:r>
             <a:r>
-              <a:rPr lang="en-US" dirty="0" smtClean="0"/>
+              <a:rPr lang="en-US" dirty="0"/>
               <a:t> and </a:t>
             </a:r>
             <a:r>
-              <a:rPr lang="en-US" dirty="0" err="1" smtClean="0"/>
+              <a:rPr lang="en-US" dirty="0" err="1"/>
               <a:t>LinkedList</a:t>
             </a:r>
-            <a:endParaRPr lang="en-US" dirty="0" smtClean="0"/>
-          </a:p>
-          <a:p>
-            <a:r>
-              <a:rPr lang="en-US" dirty="0" smtClean="0"/>
+            <a:endParaRPr lang="en-US" dirty="0"/>
+          </a:p>
+          <a:p>
+            <a:r>
+              <a:rPr lang="en-US" dirty="0"/>
               <a:t>Sorting, Comparable and Comparator</a:t>
             </a:r>
-            <a:endParaRPr lang="en-US" dirty="0"/>
           </a:p>
         </p:txBody>
       </p:sp>
@@ -6491,13 +6490,6 @@
   <p:clrMapOvr>
     <a:masterClrMapping/>
   </p:clrMapOvr>
-  <p:timing>
-    <p:tnLst>
-      <p:par>
-        <p:cTn id="1" dur="indefinite" restart="never" nodeType="tmRoot"/>
-      </p:par>
-    </p:tnLst>
-  </p:timing>
 </p:sld>
 </file>
 
@@ -6541,16 +6533,15 @@
           <a:lstStyle/>
           <a:p>
             <a:r>
-              <a:rPr lang="en-US" dirty="0" smtClean="0"/>
+              <a:rPr lang="en-US" dirty="0"/>
               <a:t>If you want to make your own implementation  of List, you need to provide all</a:t>
             </a:r>
           </a:p>
           <a:p>
             <a:r>
-              <a:rPr lang="en-US" dirty="0" smtClean="0"/>
+              <a:rPr lang="en-US" dirty="0"/>
               <a:t>of these functions…</a:t>
             </a:r>
-            <a:endParaRPr lang="en-US" dirty="0"/>
           </a:p>
         </p:txBody>
       </p:sp>
@@ -6609,11 +6600,11 @@
           <a:lstStyle/>
           <a:p>
             <a:r>
-              <a:rPr lang="en-US" dirty="0" smtClean="0"/>
+              <a:rPr lang="en-US" dirty="0"/>
               <a:t>(Actually some of these methods you can </a:t>
             </a:r>
             <a:r>
-              <a:rPr lang="en-US" dirty="0" smtClean="0">
+              <a:rPr lang="en-US" dirty="0">
                 <a:solidFill>
                   <a:srgbClr val="FF0000"/>
                 </a:solidFill>
@@ -6621,10 +6612,9 @@
               <a:t>inherit</a:t>
             </a:r>
             <a:r>
-              <a:rPr lang="en-US" dirty="0" smtClean="0"/>
+              <a:rPr lang="en-US" dirty="0"/>
               <a:t> from Object, but more on that later) </a:t>
             </a:r>
-            <a:endParaRPr lang="en-US" dirty="0"/>
           </a:p>
         </p:txBody>
       </p:sp>
@@ -6650,7 +6640,7 @@
           <a:lstStyle/>
           <a:p>
             <a:r>
-              <a:rPr lang="en-US" dirty="0" smtClean="0"/>
+              <a:rPr lang="en-US" dirty="0"/>
               <a:t>and so forth…</a:t>
             </a:r>
           </a:p>
@@ -6661,13 +6651,6 @@
   <p:clrMapOvr>
     <a:masterClrMapping/>
   </p:clrMapOvr>
-  <p:timing>
-    <p:tnLst>
-      <p:par>
-        <p:cTn id="1" dur="indefinite" restart="never" nodeType="tmRoot"/>
-      </p:par>
-    </p:tnLst>
-  </p:timing>
 </p:sld>
 </file>
 
@@ -6711,17 +6694,17 @@
           <a:lstStyle/>
           <a:p>
             <a:r>
-              <a:rPr lang="en-US" dirty="0" smtClean="0"/>
+              <a:rPr lang="en-US" dirty="0"/>
               <a:t>Because an interface is just a collection of function names it can’t be instantiated.</a:t>
             </a:r>
           </a:p>
           <a:p>
             <a:r>
-              <a:rPr lang="en-US" dirty="0" smtClean="0"/>
+              <a:rPr lang="en-US" dirty="0"/>
               <a:t>It is </a:t>
             </a:r>
             <a:r>
-              <a:rPr lang="en-US" dirty="0" smtClean="0">
+              <a:rPr lang="en-US" dirty="0">
                 <a:solidFill>
                   <a:srgbClr val="FF0000"/>
                 </a:solidFill>
@@ -6729,10 +6712,9 @@
               <a:t>abstract</a:t>
             </a:r>
             <a:r>
-              <a:rPr lang="en-US" dirty="0" smtClean="0"/>
+              <a:rPr lang="en-US" dirty="0"/>
               <a:t>.</a:t>
             </a:r>
-            <a:endParaRPr lang="en-US" dirty="0"/>
           </a:p>
         </p:txBody>
       </p:sp>
@@ -6805,13 +6787,6 @@
   <p:clrMapOvr>
     <a:masterClrMapping/>
   </p:clrMapOvr>
-  <p:timing>
-    <p:tnLst>
-      <p:par>
-        <p:cTn id="1" dur="indefinite" restart="never" nodeType="tmRoot"/>
-      </p:par>
-    </p:tnLst>
-  </p:timing>
 </p:sld>
 </file>
 
@@ -6855,35 +6830,35 @@
           <a:lstStyle/>
           <a:p>
             <a:r>
-              <a:rPr lang="en-US" dirty="0" smtClean="0"/>
+              <a:rPr lang="en-US" dirty="0"/>
               <a:t>Java provides many different kinds of lists.</a:t>
             </a:r>
           </a:p>
           <a:p>
-            <a:endParaRPr lang="en-US" dirty="0" smtClean="0"/>
-          </a:p>
-          <a:p>
-            <a:r>
-              <a:rPr lang="en-US" dirty="0" err="1" smtClean="0"/>
+            <a:endParaRPr lang="en-US" dirty="0"/>
+          </a:p>
+          <a:p>
+            <a:r>
+              <a:rPr lang="en-US" dirty="0" err="1"/>
               <a:t>ArrayList</a:t>
             </a:r>
             <a:r>
-              <a:rPr lang="en-US" dirty="0" smtClean="0"/>
+              <a:rPr lang="en-US" dirty="0"/>
               <a:t> is used most frequently.</a:t>
             </a:r>
           </a:p>
           <a:p>
-            <a:endParaRPr lang="en-US" dirty="0" smtClean="0"/>
-          </a:p>
-          <a:p>
-            <a:r>
-              <a:rPr lang="en-US" dirty="0" smtClean="0"/>
+            <a:endParaRPr lang="en-US" dirty="0"/>
+          </a:p>
+          <a:p>
+            <a:r>
+              <a:rPr lang="en-US" dirty="0"/>
               <a:t>It stores the list in an array (and copies the array into a bigger array on the </a:t>
             </a:r>
           </a:p>
           <a:p>
             <a:r>
-              <a:rPr lang="en-US" dirty="0" smtClean="0"/>
+              <a:rPr lang="en-US" dirty="0"/>
               <a:t>fly when the data in the array gets too big).</a:t>
             </a:r>
           </a:p>
@@ -6944,36 +6919,35 @@
           <a:lstStyle/>
           <a:p>
             <a:r>
-              <a:rPr lang="en-US" dirty="0" smtClean="0"/>
+              <a:rPr lang="en-US" dirty="0"/>
               <a:t>size, </a:t>
             </a:r>
             <a:r>
-              <a:rPr lang="en-US" dirty="0" err="1" smtClean="0"/>
+              <a:rPr lang="en-US" dirty="0" err="1"/>
               <a:t>isEmpty</a:t>
             </a:r>
             <a:r>
-              <a:rPr lang="en-US" dirty="0" smtClean="0"/>
+              <a:rPr lang="en-US" dirty="0"/>
               <a:t>, get, set all run in constant time </a:t>
             </a:r>
           </a:p>
           <a:p>
             <a:r>
-              <a:rPr lang="en-US" dirty="0" smtClean="0"/>
+              <a:rPr lang="en-US" dirty="0"/>
               <a:t>(because you can manipulate an element of an array directly).</a:t>
             </a:r>
           </a:p>
           <a:p>
             <a:r>
-              <a:rPr lang="en-US" dirty="0" smtClean="0"/>
+              <a:rPr lang="en-US" dirty="0"/>
               <a:t>a[x] = 4.24 will execute in the same amount of time no matter how big</a:t>
             </a:r>
           </a:p>
           <a:p>
             <a:r>
-              <a:rPr lang="en-US" dirty="0" smtClean="0"/>
+              <a:rPr lang="en-US" dirty="0"/>
               <a:t>the float array “a” is or what x is…</a:t>
             </a:r>
-            <a:endParaRPr lang="en-US" dirty="0"/>
           </a:p>
         </p:txBody>
       </p:sp>
@@ -6982,13 +6956,6 @@
   <p:clrMapOvr>
     <a:masterClrMapping/>
   </p:clrMapOvr>
-  <p:timing>
-    <p:tnLst>
-      <p:par>
-        <p:cTn id="1" dur="indefinite" restart="never" nodeType="tmRoot"/>
-      </p:par>
-    </p:tnLst>
-  </p:timing>
 </p:sld>
 </file>
 
@@ -7097,55 +7064,50 @@
           <a:lstStyle/>
           <a:p>
             <a:r>
-              <a:rPr lang="en-US" dirty="0" err="1" smtClean="0"/>
+              <a:rPr lang="en-US" dirty="0" err="1"/>
               <a:t>ensureCapacity</a:t>
             </a:r>
             <a:r>
-              <a:rPr lang="en-US" dirty="0" smtClean="0"/>
+              <a:rPr lang="en-US" dirty="0"/>
               <a:t>() is not part of the List interface (because not all lists will</a:t>
             </a:r>
           </a:p>
           <a:p>
             <a:r>
-              <a:rPr lang="en-US" dirty="0" smtClean="0"/>
-              <a:t>have a capacity</a:t>
-            </a:r>
-            <a:r>
-              <a:rPr lang="en-US" dirty="0" smtClean="0"/>
-              <a:t>)</a:t>
-            </a:r>
-          </a:p>
-          <a:p>
-            <a:endParaRPr lang="en-US" dirty="0" smtClean="0"/>
-          </a:p>
-          <a:p>
-            <a:r>
-              <a:rPr lang="en-US" dirty="0" smtClean="0"/>
+              <a:rPr lang="en-US" dirty="0"/>
+              <a:t>have a capacity)</a:t>
+            </a:r>
+          </a:p>
+          <a:p>
+            <a:endParaRPr lang="en-US" dirty="0"/>
+          </a:p>
+          <a:p>
+            <a:r>
+              <a:rPr lang="en-US" dirty="0"/>
               <a:t>For an </a:t>
             </a:r>
             <a:r>
-              <a:rPr lang="en-US" dirty="0" err="1" smtClean="0"/>
+              <a:rPr lang="en-US" dirty="0" err="1"/>
               <a:t>ArrayList</a:t>
             </a:r>
             <a:r>
-              <a:rPr lang="en-US" dirty="0" smtClean="0"/>
+              <a:rPr lang="en-US" dirty="0"/>
               <a:t>, </a:t>
             </a:r>
             <a:r>
-              <a:rPr lang="en-US" dirty="0" err="1" smtClean="0"/>
+              <a:rPr lang="en-US" dirty="0" err="1"/>
               <a:t>ensureCapacity</a:t>
             </a:r>
             <a:r>
-              <a:rPr lang="en-US" dirty="0" smtClean="0"/>
+              <a:rPr lang="en-US" dirty="0"/>
               <a:t> says make the underlying array at least this big</a:t>
             </a:r>
           </a:p>
           <a:p>
             <a:r>
-              <a:rPr lang="en-US" dirty="0" smtClean="0"/>
+              <a:rPr lang="en-US" dirty="0"/>
               <a:t>(even if I don’t have any elements added to the list)</a:t>
             </a:r>
-            <a:endParaRPr lang="en-US" dirty="0" smtClean="0"/>
           </a:p>
           <a:p>
             <a:endParaRPr lang="en-US" dirty="0"/>
@@ -7157,13 +7119,6 @@
   <p:clrMapOvr>
     <a:masterClrMapping/>
   </p:clrMapOvr>
-  <p:timing>
-    <p:tnLst>
-      <p:par>
-        <p:cTn id="1" dur="indefinite" restart="never" nodeType="tmRoot"/>
-      </p:par>
-    </p:tnLst>
-  </p:timing>
 </p:sld>
 </file>
 
@@ -7271,32 +7226,31 @@
           <a:lstStyle/>
           <a:p>
             <a:r>
-              <a:rPr lang="en-US" dirty="0" smtClean="0"/>
+              <a:rPr lang="en-US" dirty="0"/>
               <a:t>Because </a:t>
             </a:r>
             <a:r>
-              <a:rPr lang="en-US" dirty="0" err="1" smtClean="0"/>
+              <a:rPr lang="en-US" dirty="0" err="1"/>
               <a:t>ensureCapacity</a:t>
             </a:r>
             <a:r>
-              <a:rPr lang="en-US" dirty="0" smtClean="0"/>
+              <a:rPr lang="en-US" dirty="0"/>
               <a:t> is part of </a:t>
             </a:r>
             <a:r>
-              <a:rPr lang="en-US" dirty="0" err="1" smtClean="0"/>
+              <a:rPr lang="en-US" dirty="0" err="1"/>
               <a:t>ArrayList</a:t>
             </a:r>
             <a:r>
-              <a:rPr lang="en-US" dirty="0" smtClean="0"/>
+              <a:rPr lang="en-US" dirty="0"/>
               <a:t> (but not List) it cannot be invoked from </a:t>
             </a:r>
           </a:p>
           <a:p>
             <a:r>
-              <a:rPr lang="en-US" dirty="0" smtClean="0"/>
+              <a:rPr lang="en-US" dirty="0"/>
               <a:t>a List&lt;&gt; reference…</a:t>
             </a:r>
-            <a:endParaRPr lang="en-US" dirty="0"/>
           </a:p>
         </p:txBody>
       </p:sp>
@@ -7305,13 +7259,6 @@
   <p:clrMapOvr>
     <a:masterClrMapping/>
   </p:clrMapOvr>
-  <p:timing>
-    <p:tnLst>
-      <p:par>
-        <p:cTn id="1" dur="indefinite" restart="never" nodeType="tmRoot"/>
-      </p:par>
-    </p:tnLst>
-  </p:timing>
 </p:sld>
 </file>
 
@@ -7387,10 +7334,9 @@
           <a:lstStyle/>
           <a:p>
             <a:r>
-              <a:rPr lang="en-US" dirty="0" smtClean="0"/>
+              <a:rPr lang="en-US" dirty="0"/>
               <a:t>This works (but defeats the attempt to deal with the List at a more abstract level)</a:t>
             </a:r>
-            <a:endParaRPr lang="en-US" dirty="0"/>
           </a:p>
         </p:txBody>
       </p:sp>
@@ -7447,11 +7393,11 @@
           <a:lstStyle/>
           <a:p>
             <a:r>
-              <a:rPr lang="en-US" dirty="0" smtClean="0"/>
+              <a:rPr lang="en-US" dirty="0"/>
               <a:t>If I change to a different kind of List, the cast will throw a </a:t>
             </a:r>
             <a:r>
-              <a:rPr lang="en-US" dirty="0" smtClean="0">
+              <a:rPr lang="en-US" dirty="0">
                 <a:solidFill>
                   <a:srgbClr val="FF0000"/>
                 </a:solidFill>
@@ -7459,10 +7405,9 @@
               <a:t>runtime</a:t>
             </a:r>
             <a:r>
-              <a:rPr lang="en-US" dirty="0" smtClean="0"/>
+              <a:rPr lang="en-US" dirty="0"/>
               <a:t> Exception</a:t>
             </a:r>
-            <a:endParaRPr lang="en-US" dirty="0"/>
           </a:p>
         </p:txBody>
       </p:sp>
@@ -7553,16 +7498,15 @@
           <a:lstStyle/>
           <a:p>
             <a:r>
-              <a:rPr lang="en-US" dirty="0" smtClean="0"/>
+              <a:rPr lang="en-US" dirty="0"/>
               <a:t>So cast with care…  Probably better just to leave it as a List&lt;Shape&gt; and let the list manage its</a:t>
             </a:r>
           </a:p>
           <a:p>
             <a:r>
-              <a:rPr lang="en-US" dirty="0" smtClean="0"/>
+              <a:rPr lang="en-US" dirty="0"/>
               <a:t>own capacity  (optimize last!).  It will probably be fast enough.</a:t>
             </a:r>
-            <a:endParaRPr lang="en-US" dirty="0"/>
           </a:p>
         </p:txBody>
       </p:sp>
@@ -7604,13 +7548,6 @@
   <p:clrMapOvr>
     <a:masterClrMapping/>
   </p:clrMapOvr>
-  <p:timing>
-    <p:tnLst>
-      <p:par>
-        <p:cTn id="1" dur="indefinite" restart="never" nodeType="tmRoot"/>
-      </p:par>
-    </p:tnLst>
-  </p:timing>
 </p:sld>
 </file>
 
@@ -7654,24 +7591,23 @@
           <a:lstStyle/>
           <a:p>
             <a:r>
-              <a:rPr lang="en-US" dirty="0" smtClean="0"/>
+              <a:rPr lang="en-US" dirty="0"/>
               <a:t>A </a:t>
             </a:r>
             <a:r>
-              <a:rPr lang="en-US" dirty="0" err="1" smtClean="0"/>
+              <a:rPr lang="en-US" dirty="0" err="1"/>
               <a:t>LinkedList</a:t>
             </a:r>
             <a:r>
-              <a:rPr lang="en-US" dirty="0" smtClean="0"/>
+              <a:rPr lang="en-US" dirty="0"/>
               <a:t> is also a List but holds the data in a very different way…</a:t>
             </a:r>
           </a:p>
           <a:p>
             <a:r>
-              <a:rPr lang="en-US" dirty="0" smtClean="0"/>
+              <a:rPr lang="en-US" dirty="0"/>
               <a:t>Each element holds a reference to the next element..</a:t>
             </a:r>
-            <a:endParaRPr lang="en-US" dirty="0"/>
           </a:p>
         </p:txBody>
       </p:sp>
@@ -7715,10 +7651,9 @@
           <a:p>
             <a:pPr algn="ctr"/>
             <a:r>
-              <a:rPr lang="en-US" dirty="0" smtClean="0"/>
+              <a:rPr lang="en-US" dirty="0"/>
               <a:t>E</a:t>
             </a:r>
-            <a:endParaRPr lang="en-US" dirty="0"/>
           </a:p>
         </p:txBody>
       </p:sp>
@@ -7745,10 +7680,9 @@
           <a:lstStyle/>
           <a:p>
             <a:r>
-              <a:rPr lang="en-US" dirty="0" smtClean="0"/>
+              <a:rPr lang="en-US" dirty="0"/>
               <a:t>Element</a:t>
             </a:r>
-            <a:endParaRPr lang="en-US" dirty="0"/>
           </a:p>
         </p:txBody>
       </p:sp>
@@ -7808,10 +7742,9 @@
           <a:lstStyle/>
           <a:p>
             <a:r>
-              <a:rPr lang="en-US" dirty="0" smtClean="0"/>
+              <a:rPr lang="en-US" dirty="0"/>
               <a:t>next</a:t>
             </a:r>
-            <a:endParaRPr lang="en-US" dirty="0"/>
           </a:p>
         </p:txBody>
       </p:sp>
@@ -7888,10 +7821,9 @@
           <a:p>
             <a:pPr algn="ctr"/>
             <a:r>
-              <a:rPr lang="en-US" dirty="0" smtClean="0"/>
+              <a:rPr lang="en-US" dirty="0"/>
               <a:t>E</a:t>
             </a:r>
-            <a:endParaRPr lang="en-US" dirty="0"/>
           </a:p>
         </p:txBody>
       </p:sp>
@@ -7918,10 +7850,9 @@
           <a:lstStyle/>
           <a:p>
             <a:r>
-              <a:rPr lang="en-US" dirty="0" smtClean="0"/>
+              <a:rPr lang="en-US" dirty="0"/>
               <a:t>Element</a:t>
             </a:r>
-            <a:endParaRPr lang="en-US" dirty="0"/>
           </a:p>
         </p:txBody>
       </p:sp>
@@ -7981,10 +7912,9 @@
           <a:lstStyle/>
           <a:p>
             <a:r>
-              <a:rPr lang="en-US" dirty="0" smtClean="0"/>
+              <a:rPr lang="en-US" dirty="0"/>
               <a:t>next</a:t>
             </a:r>
-            <a:endParaRPr lang="en-US" dirty="0"/>
           </a:p>
         </p:txBody>
       </p:sp>
@@ -8077,10 +8007,9 @@
           <a:lstStyle/>
           <a:p>
             <a:r>
-              <a:rPr lang="en-US" dirty="0" smtClean="0"/>
+              <a:rPr lang="en-US" dirty="0"/>
               <a:t>Start</a:t>
             </a:r>
-            <a:endParaRPr lang="en-US" dirty="0"/>
           </a:p>
         </p:txBody>
       </p:sp>
@@ -8124,10 +8053,9 @@
           <a:p>
             <a:pPr algn="ctr"/>
             <a:r>
-              <a:rPr lang="en-US" dirty="0" smtClean="0"/>
+              <a:rPr lang="en-US" dirty="0"/>
               <a:t>E</a:t>
             </a:r>
-            <a:endParaRPr lang="en-US" dirty="0"/>
           </a:p>
         </p:txBody>
       </p:sp>
@@ -8154,10 +8082,9 @@
           <a:lstStyle/>
           <a:p>
             <a:r>
-              <a:rPr lang="en-US" dirty="0" smtClean="0"/>
+              <a:rPr lang="en-US" dirty="0"/>
               <a:t>Element</a:t>
             </a:r>
-            <a:endParaRPr lang="en-US" dirty="0"/>
           </a:p>
         </p:txBody>
       </p:sp>
@@ -8217,10 +8144,9 @@
           <a:lstStyle/>
           <a:p>
             <a:r>
-              <a:rPr lang="en-US" dirty="0" smtClean="0"/>
+              <a:rPr lang="en-US" dirty="0"/>
               <a:t>next</a:t>
             </a:r>
-            <a:endParaRPr lang="en-US" dirty="0"/>
           </a:p>
         </p:txBody>
       </p:sp>
@@ -8280,10 +8206,9 @@
           <a:lstStyle/>
           <a:p>
             <a:r>
-              <a:rPr lang="en-US" dirty="0" smtClean="0"/>
+              <a:rPr lang="en-US" dirty="0"/>
               <a:t>End</a:t>
             </a:r>
-            <a:endParaRPr lang="en-US" dirty="0"/>
           </a:p>
         </p:txBody>
       </p:sp>
@@ -8367,18 +8292,17 @@
           <a:lstStyle/>
           <a:p>
             <a:r>
-              <a:rPr lang="en-US" dirty="0" smtClean="0"/>
+              <a:rPr lang="en-US" dirty="0"/>
               <a:t>get()  takes linear time here.  (Not constant time like an </a:t>
             </a:r>
             <a:r>
-              <a:rPr lang="en-US" dirty="0" err="1" smtClean="0"/>
+              <a:rPr lang="en-US" dirty="0" err="1"/>
               <a:t>ArrayList</a:t>
             </a:r>
             <a:r>
-              <a:rPr lang="en-US" dirty="0" smtClean="0"/>
+              <a:rPr lang="en-US" dirty="0"/>
               <a:t>) </a:t>
             </a:r>
-            <a:endParaRPr lang="en-US" dirty="0"/>
           </a:p>
         </p:txBody>
       </p:sp>
@@ -8438,22 +8362,21 @@
           <a:lstStyle/>
           <a:p>
             <a:r>
-              <a:rPr lang="en-US" dirty="0" smtClean="0"/>
+              <a:rPr lang="en-US" dirty="0"/>
               <a:t>But, adding an element to the beginning of the list can be done in constant time.</a:t>
             </a:r>
           </a:p>
           <a:p>
             <a:r>
-              <a:rPr lang="en-US" dirty="0" smtClean="0"/>
+              <a:rPr lang="en-US" dirty="0"/>
               <a:t>For an array list, the entire list has to be copied to a new array (linear time) if you</a:t>
             </a:r>
           </a:p>
           <a:p>
             <a:r>
-              <a:rPr lang="en-US" dirty="0" smtClean="0"/>
+              <a:rPr lang="en-US" dirty="0"/>
               <a:t>add and element at the beginning</a:t>
             </a:r>
-            <a:endParaRPr lang="en-US" dirty="0"/>
           </a:p>
         </p:txBody>
       </p:sp>
@@ -8480,29 +8403,28 @@
           <a:lstStyle/>
           <a:p>
             <a:r>
-              <a:rPr lang="en-US" dirty="0" smtClean="0"/>
+              <a:rPr lang="en-US" dirty="0"/>
               <a:t>99% of the time, you want to use the </a:t>
             </a:r>
             <a:r>
-              <a:rPr lang="en-US" dirty="0" err="1" smtClean="0"/>
+              <a:rPr lang="en-US" dirty="0" err="1"/>
               <a:t>ArrayList</a:t>
             </a:r>
-            <a:endParaRPr lang="en-US" dirty="0" smtClean="0"/>
-          </a:p>
-          <a:p>
-            <a:r>
-              <a:rPr lang="en-US" dirty="0" smtClean="0"/>
+            <a:endParaRPr lang="en-US" dirty="0"/>
+          </a:p>
+          <a:p>
+            <a:r>
+              <a:rPr lang="en-US" dirty="0"/>
               <a:t>(I don’t think I’ve ever used a </a:t>
             </a:r>
             <a:r>
-              <a:rPr lang="en-US" dirty="0" err="1" smtClean="0"/>
+              <a:rPr lang="en-US" dirty="0" err="1"/>
               <a:t>LinkedList</a:t>
             </a:r>
             <a:r>
-              <a:rPr lang="en-US" dirty="0" smtClean="0"/>
+              <a:rPr lang="en-US" dirty="0"/>
               <a:t> for production code)</a:t>
             </a:r>
-            <a:endParaRPr lang="en-US" dirty="0"/>
           </a:p>
         </p:txBody>
       </p:sp>
@@ -8618,24 +8540,23 @@
           <a:lstStyle/>
           <a:p>
             <a:r>
-              <a:rPr lang="en-US" dirty="0" smtClean="0"/>
+              <a:rPr lang="en-US" dirty="0"/>
               <a:t>Adding elements to the beginning of an </a:t>
             </a:r>
             <a:r>
-              <a:rPr lang="en-US" dirty="0" err="1" smtClean="0"/>
+              <a:rPr lang="en-US" dirty="0" err="1"/>
               <a:t>ArrayList</a:t>
             </a:r>
             <a:r>
-              <a:rPr lang="en-US" dirty="0" smtClean="0"/>
+              <a:rPr lang="en-US" dirty="0"/>
               <a:t> is slow.. </a:t>
             </a:r>
           </a:p>
           <a:p>
             <a:r>
-              <a:rPr lang="en-US" dirty="0" smtClean="0"/>
+              <a:rPr lang="en-US" dirty="0"/>
               <a:t>(Linear time with the size of the list)</a:t>
             </a:r>
-            <a:endParaRPr lang="en-US" dirty="0"/>
           </a:p>
         </p:txBody>
       </p:sp>
@@ -8694,18 +8615,17 @@
           <a:lstStyle/>
           <a:p>
             <a:r>
-              <a:rPr lang="en-US" dirty="0" smtClean="0"/>
+              <a:rPr lang="en-US" dirty="0"/>
               <a:t>Adding elements to the beginning of a </a:t>
             </a:r>
             <a:r>
-              <a:rPr lang="en-US" dirty="0" err="1" smtClean="0"/>
+              <a:rPr lang="en-US" dirty="0" err="1"/>
               <a:t>LinkedList</a:t>
             </a:r>
             <a:r>
-              <a:rPr lang="en-US" dirty="0" smtClean="0"/>
+              <a:rPr lang="en-US" dirty="0"/>
               <a:t> is fast (constant time)..</a:t>
             </a:r>
-            <a:endParaRPr lang="en-US" dirty="0"/>
           </a:p>
         </p:txBody>
       </p:sp>
@@ -8819,18 +8739,17 @@
           <a:lstStyle/>
           <a:p>
             <a:r>
-              <a:rPr lang="en-US" dirty="0" smtClean="0"/>
+              <a:rPr lang="en-US" dirty="0"/>
               <a:t>get() in a </a:t>
             </a:r>
             <a:r>
-              <a:rPr lang="en-US" dirty="0" err="1" smtClean="0"/>
+              <a:rPr lang="en-US" dirty="0" err="1"/>
               <a:t>LinkedList</a:t>
             </a:r>
             <a:r>
-              <a:rPr lang="en-US" dirty="0" smtClean="0"/>
+              <a:rPr lang="en-US" dirty="0"/>
               <a:t> is slow…</a:t>
             </a:r>
-            <a:endParaRPr lang="en-US" dirty="0"/>
           </a:p>
         </p:txBody>
       </p:sp>
@@ -8983,18 +8902,17 @@
           <a:lstStyle/>
           <a:p>
             <a:r>
-              <a:rPr lang="en-US" dirty="0" smtClean="0"/>
+              <a:rPr lang="en-US" dirty="0"/>
               <a:t>get() in an </a:t>
             </a:r>
             <a:r>
-              <a:rPr lang="en-US" dirty="0" err="1" smtClean="0"/>
+              <a:rPr lang="en-US" dirty="0" err="1"/>
               <a:t>ArrayList</a:t>
             </a:r>
             <a:r>
-              <a:rPr lang="en-US" dirty="0" smtClean="0"/>
+              <a:rPr lang="en-US" dirty="0"/>
               <a:t> is fast…</a:t>
             </a:r>
-            <a:endParaRPr lang="en-US" dirty="0"/>
           </a:p>
         </p:txBody>
       </p:sp>
@@ -9078,10 +8996,9 @@
           <a:lstStyle/>
           <a:p>
             <a:r>
-              <a:rPr lang="en-US" dirty="0" smtClean="0"/>
+              <a:rPr lang="en-US" dirty="0"/>
               <a:t>An interface is a collection of function names…</a:t>
             </a:r>
-            <a:endParaRPr lang="en-US" dirty="0"/>
           </a:p>
         </p:txBody>
       </p:sp>
@@ -9108,10 +9025,9 @@
           <a:lstStyle/>
           <a:p>
             <a:r>
-              <a:rPr lang="en-US" dirty="0" smtClean="0"/>
+              <a:rPr lang="en-US" dirty="0"/>
               <a:t>Consider a new Shape: Regular Pentagon</a:t>
             </a:r>
-            <a:endParaRPr lang="en-US" dirty="0"/>
           </a:p>
         </p:txBody>
       </p:sp>
@@ -9201,7 +9117,7 @@
           <a:lstStyle/>
           <a:p>
             <a:r>
-              <a:rPr lang="en-US" dirty="0" smtClean="0">
+              <a:rPr lang="en-US" dirty="0">
                 <a:hlinkClick r:id="rId5"/>
               </a:rPr>
               <a:t>http://en.wikipedia.org/wiki/Pentagon</a:t>
@@ -9215,13 +9131,6 @@
   <p:clrMapOvr>
     <a:masterClrMapping/>
   </p:clrMapOvr>
-  <p:timing>
-    <p:tnLst>
-      <p:par>
-        <p:cTn id="1" dur="indefinite" restart="never" nodeType="tmRoot"/>
-      </p:par>
-    </p:tnLst>
-  </p:timing>
 </p:sld>
 </file>
 
@@ -9265,16 +9174,15 @@
           <a:lstStyle/>
           <a:p>
             <a:r>
-              <a:rPr lang="en-US" dirty="0" smtClean="0"/>
+              <a:rPr lang="en-US" dirty="0"/>
               <a:t>By using a reference at the Interface level (List) and not the implementation, you</a:t>
             </a:r>
           </a:p>
           <a:p>
             <a:r>
-              <a:rPr lang="en-US" dirty="0" smtClean="0"/>
+              <a:rPr lang="en-US" dirty="0"/>
               <a:t>can switch back and forth with a single line of code…</a:t>
             </a:r>
-            <a:endParaRPr lang="en-US" dirty="0"/>
           </a:p>
         </p:txBody>
       </p:sp>
@@ -9366,18 +9274,13 @@
           <a:lstStyle/>
           <a:p>
             <a:r>
-              <a:rPr lang="en-US" dirty="0" smtClean="0">
+              <a:rPr lang="en-US" dirty="0">
                 <a:solidFill>
                   <a:srgbClr val="FF0000"/>
                 </a:solidFill>
               </a:rPr>
               <a:t>or</a:t>
             </a:r>
-            <a:endParaRPr lang="en-US" dirty="0">
-              <a:solidFill>
-                <a:srgbClr val="FF0000"/>
-              </a:solidFill>
-            </a:endParaRPr>
           </a:p>
         </p:txBody>
       </p:sp>
@@ -9436,26 +9339,25 @@
           <a:lstStyle/>
           <a:p>
             <a:r>
-              <a:rPr lang="en-US" dirty="0" smtClean="0"/>
+              <a:rPr lang="en-US" dirty="0"/>
               <a:t>All of code works with either the </a:t>
             </a:r>
             <a:r>
-              <a:rPr lang="en-US" dirty="0" err="1" smtClean="0"/>
+              <a:rPr lang="en-US" dirty="0" err="1"/>
               <a:t>ArrayList</a:t>
             </a:r>
             <a:r>
-              <a:rPr lang="en-US" dirty="0" smtClean="0"/>
+              <a:rPr lang="en-US" dirty="0"/>
               <a:t> or the </a:t>
             </a:r>
             <a:r>
-              <a:rPr lang="en-US" dirty="0" err="1" smtClean="0"/>
+              <a:rPr lang="en-US" dirty="0" err="1"/>
               <a:t>LinkedList</a:t>
             </a:r>
             <a:r>
-              <a:rPr lang="en-US" dirty="0" smtClean="0"/>
+              <a:rPr lang="en-US" dirty="0"/>
               <a:t> because they are both Lists</a:t>
             </a:r>
-            <a:endParaRPr lang="en-US" dirty="0"/>
           </a:p>
         </p:txBody>
       </p:sp>
@@ -9597,35 +9499,34 @@
           <a:lstStyle/>
           <a:p>
             <a:r>
-              <a:rPr lang="en-US" dirty="0" smtClean="0"/>
+              <a:rPr lang="en-US" dirty="0"/>
               <a:t>Interfaces</a:t>
             </a:r>
           </a:p>
           <a:p>
             <a:r>
-              <a:rPr lang="en-US" dirty="0" smtClean="0"/>
+              <a:rPr lang="en-US" dirty="0"/>
               <a:t>List, </a:t>
             </a:r>
             <a:r>
-              <a:rPr lang="en-US" dirty="0" err="1" smtClean="0"/>
+              <a:rPr lang="en-US" dirty="0" err="1"/>
               <a:t>ArrayList</a:t>
             </a:r>
             <a:r>
-              <a:rPr lang="en-US" dirty="0" smtClean="0"/>
+              <a:rPr lang="en-US" dirty="0"/>
               <a:t> and </a:t>
             </a:r>
             <a:r>
-              <a:rPr lang="en-US" dirty="0" err="1" smtClean="0"/>
+              <a:rPr lang="en-US" dirty="0" err="1"/>
               <a:t>LinkedList</a:t>
             </a:r>
-            <a:endParaRPr lang="en-US" dirty="0" smtClean="0"/>
-          </a:p>
-          <a:p>
-            <a:r>
-              <a:rPr lang="en-US" dirty="0" smtClean="0"/>
+            <a:endParaRPr lang="en-US" dirty="0"/>
+          </a:p>
+          <a:p>
+            <a:r>
+              <a:rPr lang="en-US" dirty="0"/>
               <a:t>Sorting, Comparable and Comparator</a:t>
             </a:r>
-            <a:endParaRPr lang="en-US" dirty="0"/>
           </a:p>
         </p:txBody>
       </p:sp>
@@ -9774,10 +9675,9 @@
           <a:lstStyle/>
           <a:p>
             <a:r>
-              <a:rPr lang="en-US" dirty="0" smtClean="0"/>
+              <a:rPr lang="en-US" dirty="0"/>
               <a:t>We’ve seen sorting in arrays…</a:t>
             </a:r>
-            <a:endParaRPr lang="en-US" dirty="0"/>
           </a:p>
         </p:txBody>
       </p:sp>
@@ -9829,10 +9729,9 @@
           <a:lstStyle/>
           <a:p>
             <a:r>
-              <a:rPr lang="en-US" dirty="0" smtClean="0"/>
+              <a:rPr lang="en-US" dirty="0"/>
               <a:t>You can of course also sort a List…</a:t>
             </a:r>
-            <a:endParaRPr lang="en-US" dirty="0"/>
           </a:p>
         </p:txBody>
       </p:sp>
@@ -9948,26 +9847,25 @@
           <a:lstStyle/>
           <a:p>
             <a:r>
-              <a:rPr lang="en-US" dirty="0" smtClean="0"/>
+              <a:rPr lang="en-US" dirty="0"/>
               <a:t>If we look at the </a:t>
             </a:r>
             <a:r>
-              <a:rPr lang="en-US" dirty="0" err="1" smtClean="0"/>
+              <a:rPr lang="en-US" dirty="0" err="1"/>
               <a:t>Javadocs</a:t>
             </a:r>
             <a:r>
-              <a:rPr lang="en-US" dirty="0" smtClean="0"/>
+              <a:rPr lang="en-US" dirty="0"/>
               <a:t> for </a:t>
             </a:r>
             <a:r>
-              <a:rPr lang="en-US" dirty="0" err="1" smtClean="0"/>
+              <a:rPr lang="en-US" dirty="0" err="1"/>
               <a:t>Arrays.sort</a:t>
             </a:r>
             <a:r>
-              <a:rPr lang="en-US" dirty="0" smtClean="0"/>
+              <a:rPr lang="en-US" dirty="0"/>
               <a:t>()</a:t>
             </a:r>
-            <a:endParaRPr lang="en-US" dirty="0"/>
           </a:p>
         </p:txBody>
       </p:sp>
@@ -10026,10 +9924,9 @@
           <a:lstStyle/>
           <a:p>
             <a:r>
-              <a:rPr lang="en-US" dirty="0" smtClean="0"/>
+              <a:rPr lang="en-US" dirty="0"/>
               <a:t>All of the elements of the array must implement Comparable.</a:t>
             </a:r>
-            <a:endParaRPr lang="en-US" dirty="0"/>
           </a:p>
         </p:txBody>
       </p:sp>
@@ -10081,7 +9978,7 @@
           <a:lstStyle/>
           <a:p>
             <a:r>
-              <a:rPr lang="en-US" dirty="0" smtClean="0"/>
+              <a:rPr lang="en-US" dirty="0"/>
               <a:t>An interface that you will come to know well…</a:t>
             </a:r>
           </a:p>
@@ -10199,22 +10096,21 @@
           <a:lstStyle/>
           <a:p>
             <a:r>
-              <a:rPr lang="en-US" dirty="0" err="1" smtClean="0"/>
+              <a:rPr lang="en-US" dirty="0" err="1"/>
               <a:t>Arrays.sort</a:t>
             </a:r>
             <a:r>
-              <a:rPr lang="en-US" dirty="0" smtClean="0"/>
+              <a:rPr lang="en-US" dirty="0"/>
               <a:t>() and </a:t>
             </a:r>
             <a:r>
-              <a:rPr lang="en-US" dirty="0" err="1" smtClean="0"/>
+              <a:rPr lang="en-US" dirty="0" err="1"/>
               <a:t>Collections.sort</a:t>
             </a:r>
             <a:r>
-              <a:rPr lang="en-US" dirty="0" smtClean="0"/>
+              <a:rPr lang="en-US" dirty="0"/>
               <a:t>() can sort Strings because they can sort any classes that implement Comparable and String implement Comparable.  </a:t>
             </a:r>
-            <a:endParaRPr lang="en-US" dirty="0"/>
           </a:p>
         </p:txBody>
       </p:sp>
@@ -10363,32 +10259,31 @@
           <a:lstStyle/>
           <a:p>
             <a:r>
-              <a:rPr lang="en-US" dirty="0" smtClean="0"/>
+              <a:rPr lang="en-US" dirty="0"/>
               <a:t>The </a:t>
             </a:r>
             <a:r>
-              <a:rPr lang="en-US" dirty="0" err="1" smtClean="0"/>
+              <a:rPr lang="en-US" dirty="0" err="1"/>
               <a:t>javadoc</a:t>
             </a:r>
             <a:r>
-              <a:rPr lang="en-US" dirty="0" smtClean="0"/>
+              <a:rPr lang="en-US" dirty="0"/>
               <a:t> (</a:t>
             </a:r>
             <a:r>
-              <a:rPr lang="en-US" dirty="0" err="1" smtClean="0"/>
+              <a:rPr lang="en-US" dirty="0" err="1"/>
               <a:t>String.compareTo</a:t>
             </a:r>
             <a:r>
-              <a:rPr lang="en-US" dirty="0" smtClean="0"/>
+              <a:rPr lang="en-US" dirty="0"/>
               <a:t>) will tell us what it means to sort Strings according to</a:t>
             </a:r>
           </a:p>
           <a:p>
             <a:r>
-              <a:rPr lang="en-US" dirty="0" smtClean="0"/>
+              <a:rPr lang="en-US" dirty="0"/>
               <a:t>their “natural order”</a:t>
             </a:r>
-            <a:endParaRPr lang="en-US" dirty="0"/>
           </a:p>
         </p:txBody>
       </p:sp>
@@ -10440,18 +10335,17 @@
           <a:lstStyle/>
           <a:p>
             <a:r>
-              <a:rPr lang="en-US" dirty="0" smtClean="0"/>
+              <a:rPr lang="en-US" dirty="0"/>
               <a:t>Or we can look at the source code (</a:t>
             </a:r>
             <a:r>
-              <a:rPr lang="en-US" dirty="0" err="1" smtClean="0"/>
+              <a:rPr lang="en-US" dirty="0" err="1"/>
               <a:t>String.compareTo</a:t>
             </a:r>
             <a:r>
-              <a:rPr lang="en-US" dirty="0" smtClean="0"/>
+              <a:rPr lang="en-US" dirty="0"/>
               <a:t>) </a:t>
             </a:r>
-            <a:endParaRPr lang="en-US" dirty="0"/>
           </a:p>
         </p:txBody>
       </p:sp>
@@ -10549,13 +10443,6 @@
   <p:clrMapOvr>
     <a:masterClrMapping/>
   </p:clrMapOvr>
-  <p:timing>
-    <p:tnLst>
-      <p:par>
-        <p:cTn id="1" dur="indefinite" restart="never" nodeType="tmRoot"/>
-      </p:par>
-    </p:tnLst>
-  </p:timing>
 </p:sld>
 </file>
 
@@ -10599,10 +10486,9 @@
           <a:lstStyle/>
           <a:p>
             <a:r>
-              <a:rPr lang="en-US" dirty="0" smtClean="0"/>
+              <a:rPr lang="en-US" dirty="0"/>
               <a:t>Certainly the comparison works the way we expect it to….</a:t>
             </a:r>
-            <a:endParaRPr lang="en-US" dirty="0"/>
           </a:p>
         </p:txBody>
       </p:sp>
@@ -10750,33 +10636,33 @@
           <a:lstStyle/>
           <a:p>
             <a:r>
-              <a:rPr lang="en-US" dirty="0" smtClean="0"/>
+              <a:rPr lang="en-US" dirty="0"/>
               <a:t>Because we have not defined what it means to sort a Shape</a:t>
             </a:r>
           </a:p>
           <a:p>
             <a:r>
-              <a:rPr lang="en-US" dirty="0" smtClean="0"/>
+              <a:rPr lang="en-US" dirty="0"/>
               <a:t>(i.e. we have not define </a:t>
             </a:r>
             <a:r>
-              <a:rPr lang="en-US" dirty="0" err="1" smtClean="0"/>
+              <a:rPr lang="en-US" dirty="0" err="1"/>
               <a:t>compareTo</a:t>
             </a:r>
             <a:r>
-              <a:rPr lang="en-US" dirty="0" smtClean="0"/>
+              <a:rPr lang="en-US" dirty="0"/>
               <a:t>() for Shape)</a:t>
             </a:r>
           </a:p>
           <a:p>
             <a:r>
-              <a:rPr lang="en-US" dirty="0" smtClean="0"/>
+              <a:rPr lang="en-US" dirty="0"/>
               <a:t>(i.e. Shape does not implement Comparable )</a:t>
             </a:r>
           </a:p>
           <a:p>
             <a:r>
-              <a:rPr lang="en-US" dirty="0" smtClean="0"/>
+              <a:rPr lang="en-US" dirty="0"/>
               <a:t>We cannot sort a list of Shapes without additional work…</a:t>
             </a:r>
           </a:p>
@@ -10837,14 +10723,13 @@
           <a:lstStyle/>
           <a:p>
             <a:r>
-              <a:rPr lang="en-US" dirty="0" smtClean="0"/>
+              <a:rPr lang="en-US" dirty="0"/>
               <a:t>Maybe not the clearest </a:t>
             </a:r>
             <a:r>
-              <a:rPr lang="en-US" smtClean="0"/>
+              <a:rPr lang="en-US"/>
               <a:t>error message here!</a:t>
             </a:r>
-            <a:endParaRPr lang="en-US"/>
           </a:p>
         </p:txBody>
       </p:sp>
@@ -10896,16 +10781,15 @@
           <a:lstStyle/>
           <a:p>
             <a:r>
-              <a:rPr lang="en-US" dirty="0" smtClean="0"/>
+              <a:rPr lang="en-US" dirty="0"/>
               <a:t>We could make Shape implement Comparable</a:t>
             </a:r>
           </a:p>
           <a:p>
             <a:r>
-              <a:rPr lang="en-US" dirty="0" smtClean="0"/>
+              <a:rPr lang="en-US" dirty="0"/>
               <a:t>(but it turns out we are not ready to do that yet….)</a:t>
             </a:r>
-            <a:endParaRPr lang="en-US" dirty="0"/>
           </a:p>
         </p:txBody>
       </p:sp>
@@ -10997,40 +10881,40 @@
           <a:lstStyle/>
           <a:p>
             <a:r>
-              <a:rPr lang="en-US" dirty="0" smtClean="0"/>
+              <a:rPr lang="en-US" dirty="0"/>
               <a:t>Bloch item #12 has stuff</a:t>
             </a:r>
           </a:p>
           <a:p>
             <a:r>
-              <a:rPr lang="en-US" dirty="0" smtClean="0"/>
+              <a:rPr lang="en-US" dirty="0"/>
               <a:t>we need to know before</a:t>
             </a:r>
           </a:p>
           <a:p>
             <a:r>
-              <a:rPr lang="en-US" dirty="0" smtClean="0"/>
+              <a:rPr lang="en-US" dirty="0"/>
               <a:t>we implement Comparable.</a:t>
             </a:r>
           </a:p>
           <a:p>
-            <a:endParaRPr lang="en-US" dirty="0" smtClean="0"/>
-          </a:p>
-          <a:p>
-            <a:r>
-              <a:rPr lang="en-US" dirty="0" smtClean="0"/>
+            <a:endParaRPr lang="en-US" dirty="0"/>
+          </a:p>
+          <a:p>
+            <a:r>
+              <a:rPr lang="en-US" dirty="0"/>
               <a:t>But we need to understand</a:t>
             </a:r>
           </a:p>
           <a:p>
             <a:r>
-              <a:rPr lang="en-US" dirty="0" smtClean="0"/>
+              <a:rPr lang="en-US" dirty="0"/>
               <a:t>inheritance, so we will</a:t>
             </a:r>
           </a:p>
           <a:p>
             <a:r>
-              <a:rPr lang="en-US" dirty="0" smtClean="0"/>
+              <a:rPr lang="en-US" dirty="0"/>
               <a:t>come back to this later..</a:t>
             </a:r>
           </a:p>
@@ -11084,16 +10968,15 @@
           <a:lstStyle/>
           <a:p>
             <a:r>
-              <a:rPr lang="en-US" dirty="0" smtClean="0"/>
+              <a:rPr lang="en-US" dirty="0"/>
               <a:t>We can, however, make our own Comparator function </a:t>
             </a:r>
           </a:p>
           <a:p>
             <a:r>
-              <a:rPr lang="en-US" dirty="0" smtClean="0"/>
+              <a:rPr lang="en-US" dirty="0"/>
               <a:t>(that doesn’t require the Shapes to implement Comparable)</a:t>
             </a:r>
-            <a:endParaRPr lang="en-US" dirty="0"/>
           </a:p>
         </p:txBody>
       </p:sp>
@@ -11274,10 +11157,9 @@
           <a:lstStyle/>
           <a:p>
             <a:r>
-              <a:rPr lang="en-US" dirty="0" smtClean="0"/>
+              <a:rPr lang="en-US" dirty="0"/>
               <a:t>The “natural ordering” is specified by each object implementing Comparable</a:t>
             </a:r>
-            <a:endParaRPr lang="en-US" dirty="0"/>
           </a:p>
         </p:txBody>
       </p:sp>
@@ -11337,14 +11219,13 @@
           <a:lstStyle/>
           <a:p>
             <a:r>
-              <a:rPr lang="en-US" dirty="0" smtClean="0"/>
+              <a:rPr lang="en-US" dirty="0"/>
               <a:t>The ordering is specified by a </a:t>
             </a:r>
             <a:r>
-              <a:rPr lang="en-US" smtClean="0"/>
+              <a:rPr lang="en-US"/>
               <a:t>Comparator that we make…</a:t>
             </a:r>
-            <a:endParaRPr lang="en-US"/>
           </a:p>
         </p:txBody>
       </p:sp>
@@ -11525,35 +11406,35 @@
           <a:lstStyle/>
           <a:p>
             <a:r>
-              <a:rPr lang="en-US" dirty="0" smtClean="0"/>
+              <a:rPr lang="en-US" dirty="0"/>
               <a:t>Tricky syntax.</a:t>
             </a:r>
           </a:p>
           <a:p>
             <a:r>
-              <a:rPr lang="en-US" dirty="0" smtClean="0"/>
+              <a:rPr lang="en-US" dirty="0"/>
               <a:t>An inner class.</a:t>
             </a:r>
           </a:p>
           <a:p>
             <a:r>
-              <a:rPr lang="en-US" dirty="0" smtClean="0"/>
+              <a:rPr lang="en-US" dirty="0"/>
               <a:t>We instantiate and define</a:t>
             </a:r>
           </a:p>
           <a:p>
             <a:r>
-              <a:rPr lang="en-US" dirty="0" err="1" smtClean="0"/>
+              <a:rPr lang="en-US" dirty="0" err="1"/>
               <a:t>shapeComparator</a:t>
             </a:r>
             <a:r>
-              <a:rPr lang="en-US" dirty="0" smtClean="0"/>
+              <a:rPr lang="en-US" dirty="0"/>
               <a:t> at the </a:t>
             </a:r>
           </a:p>
           <a:p>
             <a:r>
-              <a:rPr lang="en-US" dirty="0" smtClean="0"/>
+              <a:rPr lang="en-US" dirty="0"/>
               <a:t>same time!</a:t>
             </a:r>
           </a:p>
@@ -11584,16 +11465,52 @@
           <a:chExt cx="0" cy="0"/>
         </a:xfrm>
       </p:grpSpPr>
-      <p:sp>
-        <p:nvSpPr>
-          <p:cNvPr id="4" name="TextBox 3"/>
+      <p:pic>
+        <p:nvPicPr>
+          <p:cNvPr id="7" name="Picture 6">
+            <a:extLst>
+              <a:ext uri="{FF2B5EF4-FFF2-40B4-BE49-F238E27FC236}">
+                <a16:creationId xmlns:a16="http://schemas.microsoft.com/office/drawing/2014/main" id="{FC75D51B-D984-4EC4-9849-84156B369437}"/>
+              </a:ext>
+            </a:extLst>
+          </p:cNvPr>
+          <p:cNvPicPr>
+            <a:picLocks noChangeAspect="1"/>
+          </p:cNvPicPr>
+          <p:nvPr/>
+        </p:nvPicPr>
+        <p:blipFill>
+          <a:blip r:embed="rId2"/>
+          <a:stretch>
+            <a:fillRect/>
+          </a:stretch>
+        </p:blipFill>
+        <p:spPr>
+          <a:xfrm>
+            <a:off x="152400" y="1981200"/>
+            <a:ext cx="5965293" cy="4572000"/>
+          </a:xfrm>
+          <a:prstGeom prst="rect">
+            <a:avLst/>
+          </a:prstGeom>
+        </p:spPr>
+      </p:pic>
+      <p:sp>
+        <p:nvSpPr>
+          <p:cNvPr id="5" name="TextBox 4">
+            <a:extLst>
+              <a:ext uri="{FF2B5EF4-FFF2-40B4-BE49-F238E27FC236}">
+                <a16:creationId xmlns:a16="http://schemas.microsoft.com/office/drawing/2014/main" id="{75573C66-F3D0-4F1D-9068-863E9AB60784}"/>
+              </a:ext>
+            </a:extLst>
+          </p:cNvPr>
           <p:cNvSpPr txBox="1"/>
           <p:nvPr/>
         </p:nvSpPr>
         <p:spPr>
           <a:xfrm>
-            <a:off x="533400" y="457200"/>
-            <a:ext cx="4713919" cy="2585323"/>
+            <a:off x="533400" y="0"/>
+            <a:ext cx="7853432" cy="369332"/>
           </a:xfrm>
           <a:prstGeom prst="rect">
             <a:avLst/>
@@ -11607,78 +11524,379 @@
           <a:lstStyle/>
           <a:p>
             <a:r>
-              <a:rPr lang="en-US" dirty="0" smtClean="0"/>
+              <a:rPr lang="en-US" dirty="0">
+                <a:latin typeface="Arial" panose="020B0604020202020204" pitchFamily="34" charset="0"/>
+                <a:cs typeface="Arial" panose="020B0604020202020204" pitchFamily="34" charset="0"/>
+              </a:rPr>
+              <a:t>Starting with Java 1.8, lambda expressions allow for a more concise syntax</a:t>
+            </a:r>
+          </a:p>
+        </p:txBody>
+      </p:sp>
+      <p:pic>
+        <p:nvPicPr>
+          <p:cNvPr id="6" name="Picture 5">
+            <a:extLst>
+              <a:ext uri="{FF2B5EF4-FFF2-40B4-BE49-F238E27FC236}">
+                <a16:creationId xmlns:a16="http://schemas.microsoft.com/office/drawing/2014/main" id="{E8205630-8581-4DB9-834C-61C41DC6DB54}"/>
+              </a:ext>
+            </a:extLst>
+          </p:cNvPr>
+          <p:cNvPicPr>
+            <a:picLocks noChangeAspect="1"/>
+          </p:cNvPicPr>
+          <p:nvPr/>
+        </p:nvPicPr>
+        <p:blipFill>
+          <a:blip r:embed="rId3"/>
+          <a:stretch>
+            <a:fillRect/>
+          </a:stretch>
+        </p:blipFill>
+        <p:spPr>
+          <a:xfrm>
+            <a:off x="4802623" y="381000"/>
+            <a:ext cx="3503177" cy="2286000"/>
+          </a:xfrm>
+          <a:prstGeom prst="rect">
+            <a:avLst/>
+          </a:prstGeom>
+        </p:spPr>
+      </p:pic>
+      <p:pic>
+        <p:nvPicPr>
+          <p:cNvPr id="8" name="Picture 7">
+            <a:extLst>
+              <a:ext uri="{FF2B5EF4-FFF2-40B4-BE49-F238E27FC236}">
+                <a16:creationId xmlns:a16="http://schemas.microsoft.com/office/drawing/2014/main" id="{BF254917-CBF5-4769-915E-B9C426F09B03}"/>
+              </a:ext>
+            </a:extLst>
+          </p:cNvPr>
+          <p:cNvPicPr>
+            <a:picLocks noChangeAspect="1"/>
+          </p:cNvPicPr>
+          <p:nvPr/>
+        </p:nvPicPr>
+        <p:blipFill>
+          <a:blip r:embed="rId4"/>
+          <a:stretch>
+            <a:fillRect/>
+          </a:stretch>
+        </p:blipFill>
+        <p:spPr>
+          <a:xfrm>
+            <a:off x="4572000" y="3733800"/>
+            <a:ext cx="1758950" cy="762000"/>
+          </a:xfrm>
+          <a:prstGeom prst="rect">
+            <a:avLst/>
+          </a:prstGeom>
+        </p:spPr>
+      </p:pic>
+      <p:pic>
+        <p:nvPicPr>
+          <p:cNvPr id="9" name="Picture 8">
+            <a:extLst>
+              <a:ext uri="{FF2B5EF4-FFF2-40B4-BE49-F238E27FC236}">
+                <a16:creationId xmlns:a16="http://schemas.microsoft.com/office/drawing/2014/main" id="{C2F528D8-E4E9-4E32-A52F-19991219595A}"/>
+              </a:ext>
+            </a:extLst>
+          </p:cNvPr>
+          <p:cNvPicPr>
+            <a:picLocks noChangeAspect="1"/>
+          </p:cNvPicPr>
+          <p:nvPr/>
+        </p:nvPicPr>
+        <p:blipFill>
+          <a:blip r:embed="rId5"/>
+          <a:stretch>
+            <a:fillRect/>
+          </a:stretch>
+        </p:blipFill>
+        <p:spPr>
+          <a:xfrm>
+            <a:off x="5867400" y="5098859"/>
+            <a:ext cx="990600" cy="539941"/>
+          </a:xfrm>
+          <a:prstGeom prst="rect">
+            <a:avLst/>
+          </a:prstGeom>
+        </p:spPr>
+      </p:pic>
+      <p:pic>
+        <p:nvPicPr>
+          <p:cNvPr id="10" name="Picture 9">
+            <a:extLst>
+              <a:ext uri="{FF2B5EF4-FFF2-40B4-BE49-F238E27FC236}">
+                <a16:creationId xmlns:a16="http://schemas.microsoft.com/office/drawing/2014/main" id="{1BC9BA85-A3C4-4089-8BC6-10B3AF9682FD}"/>
+              </a:ext>
+            </a:extLst>
+          </p:cNvPr>
+          <p:cNvPicPr>
+            <a:picLocks noChangeAspect="1"/>
+          </p:cNvPicPr>
+          <p:nvPr/>
+        </p:nvPicPr>
+        <p:blipFill>
+          <a:blip r:embed="rId6"/>
+          <a:stretch>
+            <a:fillRect/>
+          </a:stretch>
+        </p:blipFill>
+        <p:spPr>
+          <a:xfrm>
+            <a:off x="4724400" y="5943600"/>
+            <a:ext cx="762000" cy="609600"/>
+          </a:xfrm>
+          <a:prstGeom prst="rect">
+            <a:avLst/>
+          </a:prstGeom>
+        </p:spPr>
+      </p:pic>
+      <p:sp>
+        <p:nvSpPr>
+          <p:cNvPr id="2" name="Rectangle 1">
+            <a:extLst>
+              <a:ext uri="{FF2B5EF4-FFF2-40B4-BE49-F238E27FC236}">
+                <a16:creationId xmlns:a16="http://schemas.microsoft.com/office/drawing/2014/main" id="{CCB2319C-8DB1-4ED7-9394-02A4C0C5A193}"/>
+              </a:ext>
+            </a:extLst>
+          </p:cNvPr>
+          <p:cNvSpPr/>
+          <p:nvPr/>
+        </p:nvSpPr>
+        <p:spPr>
+          <a:xfrm>
+            <a:off x="3200400" y="6611779"/>
+            <a:ext cx="10820400" cy="246221"/>
+          </a:xfrm>
+          <a:prstGeom prst="rect">
+            <a:avLst/>
+          </a:prstGeom>
+        </p:spPr>
+        <p:txBody>
+          <a:bodyPr wrap="square">
+            <a:spAutoFit/>
+          </a:bodyPr>
+          <a:lstStyle/>
+          <a:p>
+            <a:r>
+              <a:rPr lang="en-US" sz="1000" dirty="0">
+                <a:latin typeface="Arial" panose="020B0604020202020204" pitchFamily="34" charset="0"/>
+                <a:cs typeface="Arial" panose="020B0604020202020204" pitchFamily="34" charset="0"/>
+              </a:rPr>
+              <a:t>https://github.com/afodor/metagenomicsTools/blob/master/src/classExamples/SimpleLambdaSort.java</a:t>
+            </a:r>
+          </a:p>
+        </p:txBody>
+      </p:sp>
+    </p:spTree>
+    <p:extLst>
+      <p:ext uri="{BB962C8B-B14F-4D97-AF65-F5344CB8AC3E}">
+        <p14:creationId xmlns:p14="http://schemas.microsoft.com/office/powerpoint/2010/main" val="2099067954"/>
+      </p:ext>
+    </p:extLst>
+  </p:cSld>
+  <p:clrMapOvr>
+    <a:masterClrMapping/>
+  </p:clrMapOvr>
+</p:sld>
+</file>
+
+<file path=ppt/slides/slide37.xml><?xml version="1.0" encoding="utf-8"?>
+<p:sld xmlns:a="http://schemas.openxmlformats.org/drawingml/2006/main" xmlns:r="http://schemas.openxmlformats.org/officeDocument/2006/relationships" xmlns:p="http://schemas.openxmlformats.org/presentationml/2006/main">
+  <p:cSld>
+    <p:spTree>
+      <p:nvGrpSpPr>
+        <p:cNvPr id="1" name=""/>
+        <p:cNvGrpSpPr/>
+        <p:nvPr/>
+      </p:nvGrpSpPr>
+      <p:grpSpPr>
+        <a:xfrm>
+          <a:off x="0" y="0"/>
+          <a:ext cx="0" cy="0"/>
+          <a:chOff x="0" y="0"/>
+          <a:chExt cx="0" cy="0"/>
+        </a:xfrm>
+      </p:grpSpPr>
+      <p:sp>
+        <p:nvSpPr>
+          <p:cNvPr id="4" name="TextBox 3">
+            <a:extLst>
+              <a:ext uri="{FF2B5EF4-FFF2-40B4-BE49-F238E27FC236}">
+                <a16:creationId xmlns:a16="http://schemas.microsoft.com/office/drawing/2014/main" id="{A67A29B0-E5D3-4EF1-B29F-93B7C7102B4A}"/>
+              </a:ext>
+            </a:extLst>
+          </p:cNvPr>
+          <p:cNvSpPr txBox="1"/>
+          <p:nvPr/>
+        </p:nvSpPr>
+        <p:spPr>
+          <a:xfrm>
+            <a:off x="304800" y="838200"/>
+            <a:ext cx="8991600" cy="369332"/>
+          </a:xfrm>
+          <a:prstGeom prst="rect">
+            <a:avLst/>
+          </a:prstGeom>
+          <a:noFill/>
+        </p:spPr>
+        <p:txBody>
+          <a:bodyPr wrap="square" rtlCol="0">
+            <a:spAutoFit/>
+          </a:bodyPr>
+          <a:lstStyle/>
+          <a:p>
+            <a:r>
+              <a:rPr lang="en-US" dirty="0">
+                <a:latin typeface="Arial" panose="020B0604020202020204" pitchFamily="34" charset="0"/>
+                <a:cs typeface="Arial" panose="020B0604020202020204" pitchFamily="34" charset="0"/>
+              </a:rPr>
+              <a:t>More on lambda functions (and closures) if/when we get to </a:t>
+            </a:r>
+            <a:r>
+              <a:rPr lang="en-US" dirty="0" err="1">
+                <a:latin typeface="Arial" panose="020B0604020202020204" pitchFamily="34" charset="0"/>
+                <a:cs typeface="Arial" panose="020B0604020202020204" pitchFamily="34" charset="0"/>
+              </a:rPr>
+              <a:t>javascript</a:t>
+            </a:r>
+            <a:r>
+              <a:rPr lang="en-US" dirty="0">
+                <a:latin typeface="Arial" panose="020B0604020202020204" pitchFamily="34" charset="0"/>
+                <a:cs typeface="Arial" panose="020B0604020202020204" pitchFamily="34" charset="0"/>
+              </a:rPr>
+              <a:t> later..</a:t>
+            </a:r>
+          </a:p>
+        </p:txBody>
+      </p:sp>
+    </p:spTree>
+    <p:extLst>
+      <p:ext uri="{BB962C8B-B14F-4D97-AF65-F5344CB8AC3E}">
+        <p14:creationId xmlns:p14="http://schemas.microsoft.com/office/powerpoint/2010/main" val="1445036944"/>
+      </p:ext>
+    </p:extLst>
+  </p:cSld>
+  <p:clrMapOvr>
+    <a:masterClrMapping/>
+  </p:clrMapOvr>
+</p:sld>
+</file>
+
+<file path=ppt/slides/slide38.xml><?xml version="1.0" encoding="utf-8"?>
+<p:sld xmlns:a="http://schemas.openxmlformats.org/drawingml/2006/main" xmlns:r="http://schemas.openxmlformats.org/officeDocument/2006/relationships" xmlns:p="http://schemas.openxmlformats.org/presentationml/2006/main">
+  <p:cSld>
+    <p:spTree>
+      <p:nvGrpSpPr>
+        <p:cNvPr id="1" name=""/>
+        <p:cNvGrpSpPr/>
+        <p:nvPr/>
+      </p:nvGrpSpPr>
+      <p:grpSpPr>
+        <a:xfrm>
+          <a:off x="0" y="0"/>
+          <a:ext cx="0" cy="0"/>
+          <a:chOff x="0" y="0"/>
+          <a:chExt cx="0" cy="0"/>
+        </a:xfrm>
+      </p:grpSpPr>
+      <p:sp>
+        <p:nvSpPr>
+          <p:cNvPr id="4" name="TextBox 3"/>
+          <p:cNvSpPr txBox="1"/>
+          <p:nvPr/>
+        </p:nvSpPr>
+        <p:spPr>
+          <a:xfrm>
+            <a:off x="533400" y="457200"/>
+            <a:ext cx="4713919" cy="2585323"/>
+          </a:xfrm>
+          <a:prstGeom prst="rect">
+            <a:avLst/>
+          </a:prstGeom>
+          <a:noFill/>
+        </p:spPr>
+        <p:txBody>
+          <a:bodyPr wrap="none" rtlCol="0">
+            <a:spAutoFit/>
+          </a:bodyPr>
+          <a:lstStyle/>
+          <a:p>
+            <a:r>
+              <a:rPr lang="en-US" dirty="0"/>
               <a:t>Still to come:</a:t>
             </a:r>
           </a:p>
           <a:p>
             <a:r>
-              <a:rPr lang="en-US" dirty="0" smtClean="0"/>
+              <a:rPr lang="en-US" dirty="0"/>
               <a:t>	Inheritance</a:t>
             </a:r>
           </a:p>
           <a:p>
             <a:r>
-              <a:rPr lang="en-US" dirty="0" smtClean="0"/>
+              <a:rPr lang="en-US" dirty="0"/>
               <a:t>	== and .equals()</a:t>
             </a:r>
           </a:p>
           <a:p>
             <a:r>
-              <a:rPr lang="en-US" dirty="0" smtClean="0"/>
+              <a:rPr lang="en-US" dirty="0"/>
               <a:t>	Overloading and Overriding</a:t>
             </a:r>
           </a:p>
           <a:p>
             <a:r>
-              <a:rPr lang="en-US" dirty="0" smtClean="0"/>
+              <a:rPr lang="en-US" dirty="0"/>
               <a:t>	source control</a:t>
             </a:r>
           </a:p>
           <a:p>
             <a:r>
-              <a:rPr lang="en-US" dirty="0" smtClean="0"/>
+              <a:rPr lang="en-US" dirty="0"/>
               <a:t>	Boxing and </a:t>
             </a:r>
             <a:r>
-              <a:rPr lang="en-US" dirty="0" err="1" smtClean="0"/>
+              <a:rPr lang="en-US" dirty="0" err="1"/>
               <a:t>unboxing</a:t>
             </a:r>
             <a:r>
-              <a:rPr lang="en-US" dirty="0" smtClean="0"/>
+              <a:rPr lang="en-US" dirty="0"/>
               <a:t> primitives in Java</a:t>
             </a:r>
           </a:p>
           <a:p>
             <a:r>
-              <a:rPr lang="en-US" dirty="0" smtClean="0"/>
+              <a:rPr lang="en-US" dirty="0"/>
               <a:t>	Exceptions</a:t>
             </a:r>
           </a:p>
           <a:p>
             <a:r>
-              <a:rPr lang="en-US" dirty="0" smtClean="0"/>
+              <a:rPr lang="en-US" dirty="0"/>
               <a:t>	Constructor chaining</a:t>
             </a:r>
           </a:p>
           <a:p>
             <a:r>
-              <a:rPr lang="en-US" dirty="0" smtClean="0"/>
+              <a:rPr lang="en-US" dirty="0"/>
               <a:t>	</a:t>
             </a:r>
             <a:r>
-              <a:rPr lang="en-US" dirty="0" err="1" smtClean="0"/>
+              <a:rPr lang="en-US" dirty="0" err="1"/>
               <a:t>HashMaps</a:t>
             </a:r>
             <a:r>
-              <a:rPr lang="en-US" dirty="0" smtClean="0"/>
+              <a:rPr lang="en-US" dirty="0"/>
               <a:t> and </a:t>
             </a:r>
             <a:r>
-              <a:rPr lang="en-US" dirty="0" err="1" smtClean="0"/>
+              <a:rPr lang="en-US" dirty="0" err="1"/>
               <a:t>HashSets</a:t>
             </a:r>
-            <a:endParaRPr lang="en-US" dirty="0" smtClean="0"/>
+            <a:endParaRPr lang="en-US" dirty="0"/>
           </a:p>
         </p:txBody>
       </p:sp>
@@ -11730,18 +11948,17 @@
           <a:lstStyle/>
           <a:p>
             <a:r>
-              <a:rPr lang="en-US" dirty="0" smtClean="0"/>
+              <a:rPr lang="en-US" dirty="0"/>
               <a:t>Circle and </a:t>
             </a:r>
             <a:r>
-              <a:rPr lang="en-US" dirty="0" err="1" smtClean="0"/>
+              <a:rPr lang="en-US" dirty="0" err="1"/>
               <a:t>RegularPentagon</a:t>
             </a:r>
             <a:r>
-              <a:rPr lang="en-US" dirty="0" smtClean="0"/>
+              <a:rPr lang="en-US" dirty="0"/>
               <a:t> have some methods in common (and some that are different)</a:t>
             </a:r>
-            <a:endParaRPr lang="en-US" dirty="0"/>
           </a:p>
         </p:txBody>
       </p:sp>
@@ -11785,10 +12002,9 @@
           <a:p>
             <a:pPr algn="ctr"/>
             <a:r>
-              <a:rPr lang="en-US" dirty="0" smtClean="0"/>
+              <a:rPr lang="en-US" dirty="0"/>
               <a:t>g</a:t>
             </a:r>
-            <a:endParaRPr lang="en-US" dirty="0"/>
           </a:p>
         </p:txBody>
       </p:sp>
@@ -11845,10 +12061,9 @@
           <a:lstStyle/>
           <a:p>
             <a:r>
-              <a:rPr lang="en-US" dirty="0" smtClean="0"/>
+              <a:rPr lang="en-US" dirty="0"/>
               <a:t>Circle</a:t>
             </a:r>
-            <a:endParaRPr lang="en-US" dirty="0"/>
           </a:p>
         </p:txBody>
       </p:sp>
@@ -11875,34 +12090,33 @@
           <a:lstStyle/>
           <a:p>
             <a:r>
-              <a:rPr lang="en-US" dirty="0" err="1" smtClean="0"/>
+              <a:rPr lang="en-US" dirty="0" err="1"/>
               <a:t>getRadius</a:t>
             </a:r>
             <a:r>
-              <a:rPr lang="en-US" dirty="0" smtClean="0"/>
+              <a:rPr lang="en-US" dirty="0"/>
               <a:t>()</a:t>
             </a:r>
           </a:p>
           <a:p>
             <a:r>
-              <a:rPr lang="en-US" dirty="0" err="1" smtClean="0"/>
+              <a:rPr lang="en-US" dirty="0" err="1"/>
               <a:t>getArea</a:t>
             </a:r>
             <a:r>
-              <a:rPr lang="en-US" dirty="0" smtClean="0"/>
+              <a:rPr lang="en-US" dirty="0"/>
               <a:t>()</a:t>
             </a:r>
           </a:p>
           <a:p>
             <a:r>
-              <a:rPr lang="en-US" dirty="0" err="1" smtClean="0"/>
+              <a:rPr lang="en-US" dirty="0" err="1"/>
               <a:t>getCircumference</a:t>
             </a:r>
             <a:r>
-              <a:rPr lang="en-US" dirty="0" smtClean="0"/>
+              <a:rPr lang="en-US" dirty="0"/>
               <a:t>()</a:t>
             </a:r>
-            <a:endParaRPr lang="en-US" dirty="0"/>
           </a:p>
         </p:txBody>
       </p:sp>
@@ -11946,10 +12160,9 @@
           <a:p>
             <a:pPr algn="ctr"/>
             <a:r>
-              <a:rPr lang="en-US" dirty="0" smtClean="0"/>
+              <a:rPr lang="en-US" dirty="0"/>
               <a:t>g</a:t>
             </a:r>
-            <a:endParaRPr lang="en-US" dirty="0"/>
           </a:p>
         </p:txBody>
       </p:sp>
@@ -12006,7 +12219,7 @@
           <a:lstStyle/>
           <a:p>
             <a:r>
-              <a:rPr lang="en-US" dirty="0" err="1" smtClean="0"/>
+              <a:rPr lang="en-US" dirty="0" err="1"/>
               <a:t>RegularPentagon</a:t>
             </a:r>
             <a:endParaRPr lang="en-US" dirty="0"/>
@@ -12036,34 +12249,33 @@
           <a:lstStyle/>
           <a:p>
             <a:r>
-              <a:rPr lang="en-US" dirty="0" err="1" smtClean="0"/>
+              <a:rPr lang="en-US" dirty="0" err="1"/>
               <a:t>getRadius</a:t>
             </a:r>
             <a:r>
-              <a:rPr lang="en-US" dirty="0" smtClean="0"/>
+              <a:rPr lang="en-US" dirty="0"/>
               <a:t>()</a:t>
             </a:r>
           </a:p>
           <a:p>
             <a:r>
-              <a:rPr lang="en-US" dirty="0" err="1" smtClean="0"/>
+              <a:rPr lang="en-US" dirty="0" err="1"/>
               <a:t>getArea</a:t>
             </a:r>
             <a:r>
-              <a:rPr lang="en-US" dirty="0" smtClean="0"/>
+              <a:rPr lang="en-US" dirty="0"/>
               <a:t>()</a:t>
             </a:r>
           </a:p>
           <a:p>
             <a:r>
-              <a:rPr lang="en-US" dirty="0" err="1" smtClean="0"/>
+              <a:rPr lang="en-US" dirty="0" err="1"/>
               <a:t>getSideLength</a:t>
             </a:r>
             <a:r>
-              <a:rPr lang="en-US" dirty="0" smtClean="0"/>
+              <a:rPr lang="en-US" dirty="0"/>
               <a:t>()</a:t>
             </a:r>
-            <a:endParaRPr lang="en-US" dirty="0"/>
           </a:p>
         </p:txBody>
       </p:sp>
@@ -12090,16 +12302,15 @@
           <a:lstStyle/>
           <a:p>
             <a:r>
-              <a:rPr lang="en-US" dirty="0" smtClean="0"/>
+              <a:rPr lang="en-US" dirty="0"/>
               <a:t>Java has a number of ways that we can indicate classes with common functionality.</a:t>
             </a:r>
           </a:p>
           <a:p>
             <a:r>
-              <a:rPr lang="en-US" dirty="0" smtClean="0"/>
+              <a:rPr lang="en-US" dirty="0"/>
               <a:t>One of these is an interface….</a:t>
             </a:r>
-            <a:endParaRPr lang="en-US" dirty="0"/>
           </a:p>
         </p:txBody>
       </p:sp>
@@ -12108,13 +12319,6 @@
   <p:clrMapOvr>
     <a:masterClrMapping/>
   </p:clrMapOvr>
-  <p:timing>
-    <p:tnLst>
-      <p:par>
-        <p:cTn id="1" dur="indefinite" restart="never" nodeType="tmRoot"/>
-      </p:par>
-    </p:tnLst>
-  </p:timing>
 </p:sld>
 </file>
 
@@ -12314,10 +12518,9 @@
           <a:lstStyle/>
           <a:p>
             <a:r>
-              <a:rPr lang="en-US" dirty="0" smtClean="0"/>
+              <a:rPr lang="en-US" dirty="0"/>
               <a:t>Circle implements Shape</a:t>
             </a:r>
-            <a:endParaRPr lang="en-US" dirty="0"/>
           </a:p>
         </p:txBody>
       </p:sp>
@@ -12377,20 +12580,19 @@
           <a:lstStyle/>
           <a:p>
             <a:r>
-              <a:rPr lang="en-US" dirty="0" err="1" smtClean="0"/>
+              <a:rPr lang="en-US" dirty="0" err="1"/>
               <a:t>RegularPengaon</a:t>
             </a:r>
             <a:r>
-              <a:rPr lang="en-US" dirty="0" smtClean="0"/>
+              <a:rPr lang="en-US" dirty="0"/>
               <a:t> </a:t>
             </a:r>
           </a:p>
           <a:p>
             <a:r>
-              <a:rPr lang="en-US" dirty="0" smtClean="0"/>
+              <a:rPr lang="en-US" dirty="0"/>
               <a:t>implements Shape</a:t>
             </a:r>
-            <a:endParaRPr lang="en-US" dirty="0"/>
           </a:p>
         </p:txBody>
       </p:sp>
@@ -12432,13 +12634,6 @@
   <p:clrMapOvr>
     <a:masterClrMapping/>
   </p:clrMapOvr>
-  <p:timing>
-    <p:tnLst>
-      <p:par>
-        <p:cTn id="1" dur="indefinite" restart="never" nodeType="tmRoot"/>
-      </p:par>
-    </p:tnLst>
-  </p:timing>
 </p:sld>
 </file>
 
@@ -12514,35 +12709,35 @@
           <a:lstStyle/>
           <a:p>
             <a:r>
-              <a:rPr lang="en-US" sz="1400" dirty="0" smtClean="0">
+              <a:rPr lang="en-US" sz="1400" dirty="0">
                 <a:latin typeface="Arial" pitchFamily="34" charset="0"/>
                 <a:cs typeface="Arial" pitchFamily="34" charset="0"/>
               </a:rPr>
               <a:t>The presence of </a:t>
             </a:r>
             <a:r>
-              <a:rPr lang="en-US" sz="1400" dirty="0" err="1" smtClean="0">
+              <a:rPr lang="en-US" sz="1400" dirty="0" err="1">
                 <a:latin typeface="Arial" pitchFamily="34" charset="0"/>
                 <a:cs typeface="Arial" pitchFamily="34" charset="0"/>
               </a:rPr>
               <a:t>getArea</a:t>
             </a:r>
             <a:r>
-              <a:rPr lang="en-US" sz="1400" dirty="0" smtClean="0">
+              <a:rPr lang="en-US" sz="1400" dirty="0">
                 <a:latin typeface="Arial" pitchFamily="34" charset="0"/>
                 <a:cs typeface="Arial" pitchFamily="34" charset="0"/>
               </a:rPr>
               <a:t>() and </a:t>
             </a:r>
             <a:r>
-              <a:rPr lang="en-US" sz="1400" dirty="0" err="1" smtClean="0">
+              <a:rPr lang="en-US" sz="1400" dirty="0" err="1">
                 <a:latin typeface="Arial" pitchFamily="34" charset="0"/>
                 <a:cs typeface="Arial" pitchFamily="34" charset="0"/>
               </a:rPr>
               <a:t>getCircumference</a:t>
             </a:r>
             <a:r>
-              <a:rPr lang="en-US" sz="1400" dirty="0" smtClean="0">
+              <a:rPr lang="en-US" sz="1400" dirty="0">
                 <a:latin typeface="Arial" pitchFamily="34" charset="0"/>
                 <a:cs typeface="Arial" pitchFamily="34" charset="0"/>
               </a:rPr>
@@ -12551,30 +12746,26 @@
           </a:p>
           <a:p>
             <a:r>
-              <a:rPr lang="en-US" sz="1400" dirty="0" smtClean="0">
+              <a:rPr lang="en-US" sz="1400" dirty="0">
                 <a:latin typeface="Arial" pitchFamily="34" charset="0"/>
                 <a:cs typeface="Arial" pitchFamily="34" charset="0"/>
               </a:rPr>
               <a:t>The functions must be named exactly  the same as in the interface (so </a:t>
             </a:r>
             <a:r>
-              <a:rPr lang="en-US" sz="1400" dirty="0" err="1" smtClean="0">
+              <a:rPr lang="en-US" sz="1400" dirty="0" err="1">
                 <a:latin typeface="Arial" pitchFamily="34" charset="0"/>
                 <a:cs typeface="Arial" pitchFamily="34" charset="0"/>
               </a:rPr>
               <a:t>getarea</a:t>
             </a:r>
             <a:r>
-              <a:rPr lang="en-US" sz="1400" dirty="0" smtClean="0">
+              <a:rPr lang="en-US" sz="1400" dirty="0">
                 <a:latin typeface="Arial" pitchFamily="34" charset="0"/>
                 <a:cs typeface="Arial" pitchFamily="34" charset="0"/>
               </a:rPr>
               <a:t>() here doesn’t compile)</a:t>
             </a:r>
-            <a:endParaRPr lang="en-US" sz="1400" dirty="0">
-              <a:latin typeface="Arial" pitchFamily="34" charset="0"/>
-              <a:cs typeface="Arial" pitchFamily="34" charset="0"/>
-            </a:endParaRPr>
           </a:p>
         </p:txBody>
       </p:sp>
@@ -12615,13 +12806,6 @@
   <p:clrMapOvr>
     <a:masterClrMapping/>
   </p:clrMapOvr>
-  <p:timing>
-    <p:tnLst>
-      <p:par>
-        <p:cTn id="1" dur="indefinite" restart="never" nodeType="tmRoot"/>
-      </p:par>
-    </p:tnLst>
-  </p:timing>
 </p:sld>
 </file>
 
@@ -12665,11 +12849,11 @@
           <a:lstStyle/>
           <a:p>
             <a:r>
-              <a:rPr lang="en-US" dirty="0" smtClean="0"/>
+              <a:rPr lang="en-US" dirty="0"/>
               <a:t>The presence of the interface allow us to work at a more </a:t>
             </a:r>
             <a:r>
-              <a:rPr lang="en-US" dirty="0" smtClean="0">
+              <a:rPr lang="en-US" dirty="0">
                 <a:solidFill>
                   <a:srgbClr val="FF0000"/>
                 </a:solidFill>
@@ -12677,16 +12861,15 @@
               <a:t>abstract</a:t>
             </a:r>
             <a:r>
-              <a:rPr lang="en-US" dirty="0" smtClean="0"/>
+              <a:rPr lang="en-US" dirty="0"/>
               <a:t> level.</a:t>
             </a:r>
           </a:p>
           <a:p>
             <a:r>
-              <a:rPr lang="en-US" dirty="0" smtClean="0"/>
+              <a:rPr lang="en-US" dirty="0"/>
               <a:t>We can manipulate objects with Shape references.</a:t>
             </a:r>
-            <a:endParaRPr lang="en-US" dirty="0"/>
           </a:p>
         </p:txBody>
       </p:sp>
@@ -12778,28 +12961,27 @@
           <a:lstStyle/>
           <a:p>
             <a:r>
-              <a:rPr lang="en-US" dirty="0" smtClean="0"/>
+              <a:rPr lang="en-US" dirty="0"/>
               <a:t>This method works at the </a:t>
             </a:r>
           </a:p>
           <a:p>
             <a:r>
-              <a:rPr lang="en-US" dirty="0" smtClean="0"/>
+              <a:rPr lang="en-US" dirty="0"/>
               <a:t>Shape level.  </a:t>
             </a:r>
           </a:p>
           <a:p>
             <a:r>
-              <a:rPr lang="en-US" dirty="0" smtClean="0"/>
+              <a:rPr lang="en-US" dirty="0"/>
               <a:t>It will work on new Shapes </a:t>
             </a:r>
           </a:p>
           <a:p>
             <a:r>
-              <a:rPr lang="en-US" dirty="0" smtClean="0"/>
+              <a:rPr lang="en-US" dirty="0"/>
               <a:t>defined in the future…</a:t>
             </a:r>
-            <a:endParaRPr lang="en-US" dirty="0"/>
           </a:p>
         </p:txBody>
       </p:sp>
@@ -12859,16 +13041,15 @@
           <a:lstStyle/>
           <a:p>
             <a:r>
-              <a:rPr lang="en-US" dirty="0" smtClean="0"/>
+              <a:rPr lang="en-US" dirty="0"/>
               <a:t>I can mix different Shapes</a:t>
             </a:r>
           </a:p>
           <a:p>
             <a:r>
-              <a:rPr lang="en-US" dirty="0" smtClean="0"/>
+              <a:rPr lang="en-US" dirty="0"/>
               <a:t>within my list</a:t>
             </a:r>
-            <a:endParaRPr lang="en-US" dirty="0"/>
           </a:p>
         </p:txBody>
       </p:sp>
@@ -12909,13 +13090,6 @@
   <p:clrMapOvr>
     <a:masterClrMapping/>
   </p:clrMapOvr>
-  <p:timing>
-    <p:tnLst>
-      <p:par>
-        <p:cTn id="1" dur="indefinite" restart="never" nodeType="tmRoot"/>
-      </p:par>
-    </p:tnLst>
-  </p:timing>
 </p:sld>
 </file>
 
@@ -12959,35 +13133,34 @@
           <a:lstStyle/>
           <a:p>
             <a:r>
-              <a:rPr lang="en-US" dirty="0" smtClean="0"/>
+              <a:rPr lang="en-US" dirty="0"/>
               <a:t>Interfaces</a:t>
             </a:r>
           </a:p>
           <a:p>
             <a:r>
-              <a:rPr lang="en-US" dirty="0" smtClean="0"/>
+              <a:rPr lang="en-US" dirty="0"/>
               <a:t>List, </a:t>
             </a:r>
             <a:r>
-              <a:rPr lang="en-US" dirty="0" err="1" smtClean="0"/>
+              <a:rPr lang="en-US" dirty="0" err="1"/>
               <a:t>ArrayList</a:t>
             </a:r>
             <a:r>
-              <a:rPr lang="en-US" dirty="0" smtClean="0"/>
+              <a:rPr lang="en-US" dirty="0"/>
               <a:t> and </a:t>
             </a:r>
             <a:r>
-              <a:rPr lang="en-US" dirty="0" err="1" smtClean="0"/>
+              <a:rPr lang="en-US" dirty="0" err="1"/>
               <a:t>LinkedList</a:t>
             </a:r>
-            <a:endParaRPr lang="en-US" dirty="0" smtClean="0"/>
-          </a:p>
-          <a:p>
-            <a:r>
-              <a:rPr lang="en-US" dirty="0" smtClean="0"/>
+            <a:endParaRPr lang="en-US" dirty="0"/>
+          </a:p>
+          <a:p>
+            <a:r>
+              <a:rPr lang="en-US" dirty="0"/>
               <a:t>Sorting, Comparable and Comparator</a:t>
             </a:r>
-            <a:endParaRPr lang="en-US" dirty="0"/>
           </a:p>
         </p:txBody>
       </p:sp>
@@ -13029,13 +13202,6 @@
   <p:clrMapOvr>
     <a:masterClrMapping/>
   </p:clrMapOvr>
-  <p:timing>
-    <p:tnLst>
-      <p:par>
-        <p:cTn id="1" dur="indefinite" restart="never" nodeType="tmRoot"/>
-      </p:par>
-    </p:tnLst>
-  </p:timing>
 </p:sld>
 </file>
 
@@ -13079,17 +13245,17 @@
           <a:lstStyle/>
           <a:p>
             <a:r>
-              <a:rPr lang="en-US" dirty="0" smtClean="0"/>
+              <a:rPr lang="en-US" dirty="0"/>
               <a:t>We can now understand the relationship between </a:t>
             </a:r>
           </a:p>
           <a:p>
             <a:r>
-              <a:rPr lang="en-US" dirty="0" smtClean="0"/>
+              <a:rPr lang="en-US" dirty="0"/>
               <a:t>the </a:t>
             </a:r>
             <a:r>
-              <a:rPr lang="en-US" dirty="0" smtClean="0">
+              <a:rPr lang="en-US" dirty="0">
                 <a:solidFill>
                   <a:srgbClr val="FF0000"/>
                 </a:solidFill>
@@ -13097,11 +13263,11 @@
               <a:t>interface</a:t>
             </a:r>
             <a:r>
-              <a:rPr lang="en-US" dirty="0" smtClean="0"/>
+              <a:rPr lang="en-US" dirty="0"/>
               <a:t> List and the  </a:t>
             </a:r>
             <a:r>
-              <a:rPr lang="en-US" dirty="0" smtClean="0">
+              <a:rPr lang="en-US" dirty="0">
                 <a:solidFill>
                   <a:srgbClr val="FF0000"/>
                 </a:solidFill>
@@ -13109,11 +13275,11 @@
               <a:t>implementation</a:t>
             </a:r>
             <a:r>
-              <a:rPr lang="en-US" dirty="0" smtClean="0"/>
+              <a:rPr lang="en-US" dirty="0"/>
               <a:t> </a:t>
             </a:r>
             <a:r>
-              <a:rPr lang="en-US" dirty="0" err="1" smtClean="0"/>
+              <a:rPr lang="en-US" dirty="0" err="1"/>
               <a:t>ArrayList</a:t>
             </a:r>
             <a:endParaRPr lang="en-US" dirty="0"/>
@@ -13210,10 +13376,9 @@
           <a:lstStyle/>
           <a:p>
             <a:r>
-              <a:rPr lang="en-US" dirty="0" smtClean="0"/>
+              <a:rPr lang="en-US" dirty="0"/>
               <a:t>We will talk about the “extends” later</a:t>
             </a:r>
-            <a:endParaRPr lang="en-US" dirty="0"/>
           </a:p>
         </p:txBody>
       </p:sp>
@@ -13240,16 +13405,15 @@
           <a:lstStyle/>
           <a:p>
             <a:r>
-              <a:rPr lang="en-US" dirty="0" smtClean="0"/>
+              <a:rPr lang="en-US" dirty="0"/>
               <a:t>The List interface is a collection of function names that an implementing list</a:t>
             </a:r>
           </a:p>
           <a:p>
             <a:r>
-              <a:rPr lang="en-US" dirty="0" smtClean="0"/>
+              <a:rPr lang="en-US" dirty="0"/>
               <a:t>must define in order to be compiled as a List..</a:t>
             </a:r>
-            <a:endParaRPr lang="en-US" dirty="0"/>
           </a:p>
         </p:txBody>
       </p:sp>
@@ -13290,13 +13454,6 @@
   <p:clrMapOvr>
     <a:masterClrMapping/>
   </p:clrMapOvr>
-  <p:timing>
-    <p:tnLst>
-      <p:par>
-        <p:cTn id="1" dur="indefinite" restart="never" nodeType="tmRoot"/>
-      </p:par>
-    </p:tnLst>
-  </p:timing>
 </p:sld>
 </file>
 

</xml_diff>